<commit_message>
Updated teh presentation.  Need to change the last slides background window
</commit_message>
<xml_diff>
--- a/slides/KeyStone_Interrupts.pptx
+++ b/slides/KeyStone_Interrupts.pptx
@@ -5,10 +5,10 @@
     <p:sldMasterId id="2147483648" r:id="rId1"/>
   </p:sldMasterIdLst>
   <p:notesMasterIdLst>
-    <p:notesMasterId r:id="rId40"/>
+    <p:notesMasterId r:id="rId39"/>
   </p:notesMasterIdLst>
   <p:handoutMasterIdLst>
-    <p:handoutMasterId r:id="rId41"/>
+    <p:handoutMasterId r:id="rId40"/>
   </p:handoutMasterIdLst>
   <p:sldIdLst>
     <p:sldId id="265" r:id="rId2"/>
@@ -42,18 +42,17 @@
     <p:sldId id="291" r:id="rId30"/>
     <p:sldId id="292" r:id="rId31"/>
     <p:sldId id="293" r:id="rId32"/>
-    <p:sldId id="299" r:id="rId33"/>
-    <p:sldId id="301" r:id="rId34"/>
-    <p:sldId id="300" r:id="rId35"/>
-    <p:sldId id="302" r:id="rId36"/>
-    <p:sldId id="307" r:id="rId37"/>
-    <p:sldId id="308" r:id="rId38"/>
-    <p:sldId id="295" r:id="rId39"/>
+    <p:sldId id="301" r:id="rId33"/>
+    <p:sldId id="300" r:id="rId34"/>
+    <p:sldId id="302" r:id="rId35"/>
+    <p:sldId id="307" r:id="rId36"/>
+    <p:sldId id="308" r:id="rId37"/>
+    <p:sldId id="295" r:id="rId38"/>
   </p:sldIdLst>
   <p:sldSz cx="9144000" cy="6858000" type="screen4x3"/>
   <p:notesSz cx="7010400" cy="9296400"/>
   <p:custDataLst>
-    <p:tags r:id="rId42"/>
+    <p:tags r:id="rId41"/>
   </p:custDataLst>
   <p:defaultTextStyle>
     <a:defPPr>
@@ -8725,7 +8724,7 @@
           <a:graphicData uri="http://schemas.openxmlformats.org/presentationml/2006/ole">
             <mc:AlternateContent xmlns:mc="http://schemas.openxmlformats.org/markup-compatibility/2006">
               <mc:Choice xmlns:v="urn:schemas-microsoft-com:vml" Requires="v">
-                <p:oleObj spid="_x0000_s10249" name="Visio" r:id="rId3" imgW="9044738" imgH="6169084" progId="Visio.Drawing.11">
+                <p:oleObj spid="_x0000_s10250" name="Visio" r:id="rId3" imgW="9044738" imgH="6169084" progId="Visio.Drawing.11">
                   <p:embed/>
                 </p:oleObj>
               </mc:Choice>
@@ -8996,7 +8995,7 @@
           <a:graphicData uri="http://schemas.openxmlformats.org/presentationml/2006/ole">
             <mc:AlternateContent xmlns:mc="http://schemas.openxmlformats.org/markup-compatibility/2006">
               <mc:Choice xmlns:v="urn:schemas-microsoft-com:vml" Requires="v">
-                <p:oleObj spid="_x0000_s11272" name="Visio" r:id="rId4" imgW="9044738" imgH="6169084" progId="Visio.Drawing.11">
+                <p:oleObj spid="_x0000_s11273" name="Visio" r:id="rId4" imgW="9044738" imgH="6169084" progId="Visio.Drawing.11">
                   <p:embed/>
                 </p:oleObj>
               </mc:Choice>
@@ -10478,7 +10477,7 @@
           <a:graphicData uri="http://schemas.openxmlformats.org/presentationml/2006/ole">
             <mc:AlternateContent xmlns:mc="http://schemas.openxmlformats.org/markup-compatibility/2006">
               <mc:Choice xmlns:v="urn:schemas-microsoft-com:vml" Requires="v">
-                <p:oleObj spid="_x0000_s12293" name="Visio" r:id="rId3" imgW="9044738" imgH="6169084" progId="Visio.Drawing.11">
+                <p:oleObj spid="_x0000_s12294" name="Visio" r:id="rId3" imgW="9044738" imgH="6169084" progId="Visio.Drawing.11">
                   <p:embed/>
                 </p:oleObj>
               </mc:Choice>
@@ -11973,7 +11972,7 @@
           <a:graphicData uri="http://schemas.openxmlformats.org/presentationml/2006/ole">
             <mc:AlternateContent xmlns:mc="http://schemas.openxmlformats.org/markup-compatibility/2006">
               <mc:Choice xmlns:v="urn:schemas-microsoft-com:vml" Requires="v">
-                <p:oleObj spid="_x0000_s3090" name="Visio" r:id="rId3" imgW="8397082" imgH="6796932" progId="Visio.Drawing.11">
+                <p:oleObj spid="_x0000_s3091" name="Visio" r:id="rId3" imgW="8397082" imgH="6796932" progId="Visio.Drawing.11">
                   <p:embed/>
                 </p:oleObj>
               </mc:Choice>
@@ -13410,7 +13409,7 @@
       </p:sp>
       <p:pic>
         <p:nvPicPr>
-          <p:cNvPr id="34818" name="Picture 2"/>
+          <p:cNvPr id="35842" name="Picture 2"/>
           <p:cNvPicPr>
             <a:picLocks noChangeAspect="1" noChangeArrowheads="1"/>
           </p:cNvPicPr>
@@ -13425,8 +13424,8 @@
         </p:blipFill>
         <p:spPr bwMode="auto">
           <a:xfrm>
-            <a:off x="1328738" y="1352550"/>
-            <a:ext cx="6486525" cy="4152900"/>
+            <a:off x="576263" y="1619250"/>
+            <a:ext cx="7991475" cy="3619500"/>
           </a:xfrm>
           <a:prstGeom prst="rect">
             <a:avLst/>
@@ -13474,161 +13473,6 @@
       </p:grpSpPr>
       <p:sp>
         <p:nvSpPr>
-          <p:cNvPr id="3" name="Title 1"/>
-          <p:cNvSpPr txBox="1">
-            <a:spLocks/>
-          </p:cNvSpPr>
-          <p:nvPr/>
-        </p:nvSpPr>
-        <p:spPr>
-          <a:xfrm>
-            <a:off x="449279" y="271604"/>
-            <a:ext cx="7391022" cy="1131684"/>
-          </a:xfrm>
-          <a:prstGeom prst="rect">
-            <a:avLst/>
-          </a:prstGeom>
-        </p:spPr>
-        <p:txBody>
-          <a:bodyPr>
-            <a:normAutofit/>
-          </a:bodyPr>
-          <a:lstStyle/>
-          <a:p>
-            <a:pPr marL="0" marR="0" lvl="0" indent="0" algn="ctr" defTabSz="914400" rtl="0" eaLnBrk="0" fontAlgn="base" latinLnBrk="0" hangingPunct="0">
-              <a:lnSpc>
-                <a:spcPct val="85000"/>
-              </a:lnSpc>
-              <a:spcBef>
-                <a:spcPct val="0"/>
-              </a:spcBef>
-              <a:spcAft>
-                <a:spcPct val="0"/>
-              </a:spcAft>
-              <a:buClrTx/>
-              <a:buSzTx/>
-              <a:buFontTx/>
-              <a:buNone/>
-              <a:tabLst/>
-              <a:defRPr/>
-            </a:pPr>
-            <a:r>
-              <a:rPr kumimoji="0" lang="en-US" sz="3600" b="1" i="0" u="none" strike="noStrike" kern="0" cap="none" spc="0" normalizeH="0" baseline="0" noProof="0" dirty="0" smtClean="0">
-                <a:ln>
-                  <a:noFill/>
-                </a:ln>
-                <a:solidFill>
-                  <a:schemeClr val="tx2"/>
-                </a:solidFill>
-                <a:effectLst/>
-                <a:uLnTx/>
-                <a:uFillTx/>
-                <a:latin typeface="Calibri" pitchFamily="34" charset="0"/>
-                <a:ea typeface="+mj-ea"/>
-                <a:cs typeface="Calibri" pitchFamily="34" charset="0"/>
-              </a:rPr>
-              <a:t>ARM A15 Interrupt Scheme</a:t>
-            </a:r>
-            <a:endParaRPr kumimoji="0" lang="en-US" sz="3600" b="1" i="0" u="none" strike="noStrike" kern="0" cap="none" spc="0" normalizeH="0" baseline="0" noProof="0" dirty="0">
-              <a:ln>
-                <a:noFill/>
-              </a:ln>
-              <a:solidFill>
-                <a:schemeClr val="tx2"/>
-              </a:solidFill>
-              <a:effectLst/>
-              <a:uLnTx/>
-              <a:uFillTx/>
-              <a:latin typeface="Calibri" pitchFamily="34" charset="0"/>
-              <a:ea typeface="+mj-ea"/>
-              <a:cs typeface="Calibri" pitchFamily="34" charset="0"/>
-            </a:endParaRPr>
-          </a:p>
-        </p:txBody>
-      </p:sp>
-      <p:sp>
-        <p:nvSpPr>
-          <p:cNvPr id="4" name="Slide Number Placeholder 3"/>
-          <p:cNvSpPr>
-            <a:spLocks noGrp="1"/>
-          </p:cNvSpPr>
-          <p:nvPr>
-            <p:ph type="sldNum" sz="quarter" idx="10"/>
-          </p:nvPr>
-        </p:nvSpPr>
-        <p:spPr/>
-        <p:txBody>
-          <a:bodyPr/>
-          <a:lstStyle/>
-          <a:p>
-            <a:fld id="{4BD60626-1ACC-48B1-8201-AA7BD5684B54}" type="slidenum">
-              <a:rPr lang="en-US" smtClean="0"/>
-              <a:pPr/>
-              <a:t>33</a:t>
-            </a:fld>
-            <a:endParaRPr lang="en-US" dirty="0"/>
-          </a:p>
-        </p:txBody>
-      </p:sp>
-      <p:pic>
-        <p:nvPicPr>
-          <p:cNvPr id="35842" name="Picture 2"/>
-          <p:cNvPicPr>
-            <a:picLocks noChangeAspect="1" noChangeArrowheads="1"/>
-          </p:cNvPicPr>
-          <p:nvPr/>
-        </p:nvPicPr>
-        <p:blipFill>
-          <a:blip r:embed="rId2" cstate="print"/>
-          <a:srcRect/>
-          <a:stretch>
-            <a:fillRect/>
-          </a:stretch>
-        </p:blipFill>
-        <p:spPr bwMode="auto">
-          <a:xfrm>
-            <a:off x="576263" y="1619250"/>
-            <a:ext cx="7991475" cy="3619500"/>
-          </a:xfrm>
-          <a:prstGeom prst="rect">
-            <a:avLst/>
-          </a:prstGeom>
-          <a:noFill/>
-          <a:ln w="9525">
-            <a:noFill/>
-            <a:miter lim="800000"/>
-            <a:headEnd/>
-            <a:tailEnd/>
-          </a:ln>
-        </p:spPr>
-      </p:pic>
-    </p:spTree>
-  </p:cSld>
-  <p:clrMapOvr>
-    <a:masterClrMapping/>
-  </p:clrMapOvr>
-</p:sld>
-</file>
-
-<file path=ppt/slides/slide34.xml><?xml version="1.0" encoding="utf-8"?>
-<p:sld xmlns:a="http://schemas.openxmlformats.org/drawingml/2006/main" xmlns:r="http://schemas.openxmlformats.org/officeDocument/2006/relationships" xmlns:p="http://schemas.openxmlformats.org/presentationml/2006/main">
-  <p:cSld>
-    <p:spTree>
-      <p:nvGrpSpPr>
-        <p:cNvPr id="1" name=""/>
-        <p:cNvGrpSpPr/>
-        <p:nvPr/>
-      </p:nvGrpSpPr>
-      <p:grpSpPr>
-        <a:xfrm>
-          <a:off x="0" y="0"/>
-          <a:ext cx="0" cy="0"/>
-          <a:chOff x="0" y="0"/>
-          <a:chExt cx="0" cy="0"/>
-        </a:xfrm>
-      </p:grpSpPr>
-      <p:sp>
-        <p:nvSpPr>
           <p:cNvPr id="5" name="Slide Number Placeholder 4"/>
           <p:cNvSpPr>
             <a:spLocks noGrp="1"/>
@@ -13645,7 +13489,7 @@
             <a:fld id="{3B20521C-F793-4067-BB07-C7AF74E21EF3}" type="slidenum">
               <a:rPr lang="en-US" smtClean="0"/>
               <a:pPr/>
-              <a:t>34</a:t>
+              <a:t>33</a:t>
             </a:fld>
             <a:endParaRPr lang="en-US" dirty="0"/>
           </a:p>
@@ -13762,10 +13606,17 @@
   <p:clrMapOvr>
     <a:masterClrMapping/>
   </p:clrMapOvr>
+  <p:timing>
+    <p:tnLst>
+      <p:par>
+        <p:cTn id="1" dur="indefinite" restart="never" nodeType="tmRoot"/>
+      </p:par>
+    </p:tnLst>
+  </p:timing>
 </p:sld>
 </file>
 
-<file path=ppt/slides/slide35.xml><?xml version="1.0" encoding="utf-8"?>
+<file path=ppt/slides/slide34.xml><?xml version="1.0" encoding="utf-8"?>
 <p:sld xmlns:a="http://schemas.openxmlformats.org/drawingml/2006/main" xmlns:r="http://schemas.openxmlformats.org/officeDocument/2006/relationships" xmlns:p="http://schemas.openxmlformats.org/presentationml/2006/main">
   <p:cSld>
     <p:spTree>
@@ -13800,7 +13651,7 @@
             <a:fld id="{3B20521C-F793-4067-BB07-C7AF74E21EF3}" type="slidenum">
               <a:rPr lang="en-US" smtClean="0"/>
               <a:pPr/>
-              <a:t>35</a:t>
+              <a:t>34</a:t>
             </a:fld>
             <a:endParaRPr lang="en-US" dirty="0"/>
           </a:p>
@@ -13877,10 +13728,17 @@
   <p:clrMapOvr>
     <a:masterClrMapping/>
   </p:clrMapOvr>
+  <p:timing>
+    <p:tnLst>
+      <p:par>
+        <p:cTn id="1" dur="indefinite" restart="never" nodeType="tmRoot"/>
+      </p:par>
+    </p:tnLst>
+  </p:timing>
 </p:sld>
 </file>
 
-<file path=ppt/slides/slide36.xml><?xml version="1.0" encoding="utf-8"?>
+<file path=ppt/slides/slide35.xml><?xml version="1.0" encoding="utf-8"?>
 <p:sld xmlns:a="http://schemas.openxmlformats.org/drawingml/2006/main" xmlns:r="http://schemas.openxmlformats.org/officeDocument/2006/relationships" xmlns:p="http://schemas.openxmlformats.org/presentationml/2006/main">
   <p:cSld>
     <p:spTree>
@@ -13938,7 +13796,7 @@
             <a:fld id="{3B20521C-F793-4067-BB07-C7AF74E21EF3}" type="slidenum">
               <a:rPr lang="en-US" smtClean="0"/>
               <a:pPr/>
-              <a:t>36</a:t>
+              <a:t>35</a:t>
             </a:fld>
             <a:endParaRPr lang="en-US" dirty="0"/>
           </a:p>
@@ -13969,14 +13827,25 @@
           <a:prstGeom prst="rect">
             <a:avLst/>
           </a:prstGeom>
-          <a:noFill/>
-          <a:ln w="9525">
-            <a:noFill/>
-            <a:miter lim="800000"/>
+          <a:ln>
             <a:headEnd/>
             <a:tailEnd/>
           </a:ln>
         </p:spPr>
+        <p:style>
+          <a:lnRef idx="1">
+            <a:schemeClr val="accent2"/>
+          </a:lnRef>
+          <a:fillRef idx="2">
+            <a:schemeClr val="accent2"/>
+          </a:fillRef>
+          <a:effectRef idx="1">
+            <a:schemeClr val="accent2"/>
+          </a:effectRef>
+          <a:fontRef idx="minor">
+            <a:schemeClr val="dk1"/>
+          </a:fontRef>
+        </p:style>
       </p:pic>
     </p:spTree>
   </p:cSld>
@@ -13993,7 +13862,7 @@
 </p:sld>
 </file>
 
-<file path=ppt/slides/slide37.xml><?xml version="1.0" encoding="utf-8"?>
+<file path=ppt/slides/slide36.xml><?xml version="1.0" encoding="utf-8"?>
 <p:sld xmlns:a="http://schemas.openxmlformats.org/drawingml/2006/main" xmlns:r="http://schemas.openxmlformats.org/officeDocument/2006/relationships" xmlns:p="http://schemas.openxmlformats.org/presentationml/2006/main">
   <p:cSld>
     <p:spTree>
@@ -14051,7 +13920,7 @@
             <a:fld id="{3B20521C-F793-4067-BB07-C7AF74E21EF3}" type="slidenum">
               <a:rPr lang="en-US" smtClean="0"/>
               <a:pPr/>
-              <a:t>37</a:t>
+              <a:t>36</a:t>
             </a:fld>
             <a:endParaRPr lang="en-US" dirty="0"/>
           </a:p>
@@ -14126,10 +13995,17 @@
   <p:clrMapOvr>
     <a:masterClrMapping/>
   </p:clrMapOvr>
+  <p:timing>
+    <p:tnLst>
+      <p:par>
+        <p:cTn id="1" dur="indefinite" restart="never" nodeType="tmRoot"/>
+      </p:par>
+    </p:tnLst>
+  </p:timing>
 </p:sld>
 </file>
 
-<file path=ppt/slides/slide38.xml><?xml version="1.0" encoding="utf-8"?>
+<file path=ppt/slides/slide37.xml><?xml version="1.0" encoding="utf-8"?>
 <p:sld xmlns:a="http://schemas.openxmlformats.org/drawingml/2006/main" xmlns:r="http://schemas.openxmlformats.org/officeDocument/2006/relationships" xmlns:p="http://schemas.openxmlformats.org/presentationml/2006/main">
   <p:cSld>
     <p:spTree>
@@ -14202,7 +14078,7 @@
             <a:fld id="{803D9FE4-F784-4A94-8F3E-54A098F0E8CC}" type="slidenum">
               <a:rPr lang="en-US" smtClean="0"/>
               <a:pPr/>
-              <a:t>38</a:t>
+              <a:t>37</a:t>
             </a:fld>
             <a:endParaRPr lang="en-US" dirty="0"/>
           </a:p>
@@ -14213,6 +14089,13 @@
   <p:clrMapOvr>
     <a:masterClrMapping/>
   </p:clrMapOvr>
+  <p:timing>
+    <p:tnLst>
+      <p:par>
+        <p:cTn id="1" dur="indefinite" restart="never" nodeType="tmRoot"/>
+      </p:par>
+    </p:tnLst>
+  </p:timing>
 </p:sld>
 </file>
 
@@ -14285,7 +14168,7 @@
           <a:graphicData uri="http://schemas.openxmlformats.org/presentationml/2006/ole">
             <mc:AlternateContent xmlns:mc="http://schemas.openxmlformats.org/markup-compatibility/2006">
               <mc:Choice xmlns:v="urn:schemas-microsoft-com:vml" Requires="v">
-                <p:oleObj spid="_x0000_s1044" name="Visio" r:id="rId3" imgW="8181318" imgH="5750031" progId="Visio.Drawing.11">
+                <p:oleObj spid="_x0000_s1045" name="Visio" r:id="rId3" imgW="8181318" imgH="5750031" progId="Visio.Drawing.11">
                   <p:embed/>
                 </p:oleObj>
               </mc:Choice>
@@ -14404,7 +14287,7 @@
           <a:graphicData uri="http://schemas.openxmlformats.org/presentationml/2006/ole">
             <mc:AlternateContent xmlns:mc="http://schemas.openxmlformats.org/markup-compatibility/2006">
               <mc:Choice xmlns:v="urn:schemas-microsoft-com:vml" Requires="v">
-                <p:oleObj spid="_x0000_s4110" name="Visio" r:id="rId3" imgW="6401070" imgH="4573925" progId="Visio.Drawing.11">
+                <p:oleObj spid="_x0000_s4111" name="Visio" r:id="rId3" imgW="6401070" imgH="4573925" progId="Visio.Drawing.11">
                   <p:embed/>
                 </p:oleObj>
               </mc:Choice>
@@ -14528,7 +14411,7 @@
           <a:graphicData uri="http://schemas.openxmlformats.org/presentationml/2006/ole">
             <mc:AlternateContent xmlns:mc="http://schemas.openxmlformats.org/markup-compatibility/2006">
               <mc:Choice xmlns:v="urn:schemas-microsoft-com:vml" Requires="v">
-                <p:oleObj spid="_x0000_s5134" name="Visio" r:id="rId3" imgW="6401070" imgH="4764674" progId="Visio.Drawing.11">
+                <p:oleObj spid="_x0000_s5135" name="Visio" r:id="rId3" imgW="6401070" imgH="4764674" progId="Visio.Drawing.11">
                   <p:embed/>
                 </p:oleObj>
               </mc:Choice>

</xml_diff>

<commit_message>
Finishing (for now - July 2014) updating this module
</commit_message>
<xml_diff>
--- a/slides/KeyStone_Interrupts.pptx
+++ b/slides/KeyStone_Interrupts.pptx
@@ -5,54 +5,55 @@
     <p:sldMasterId id="2147483648" r:id="rId1"/>
   </p:sldMasterIdLst>
   <p:notesMasterIdLst>
-    <p:notesMasterId r:id="rId39"/>
+    <p:notesMasterId r:id="rId40"/>
   </p:notesMasterIdLst>
   <p:handoutMasterIdLst>
-    <p:handoutMasterId r:id="rId40"/>
+    <p:handoutMasterId r:id="rId41"/>
   </p:handoutMasterIdLst>
   <p:sldIdLst>
     <p:sldId id="265" r:id="rId2"/>
     <p:sldId id="271" r:id="rId3"/>
-    <p:sldId id="297" r:id="rId4"/>
-    <p:sldId id="275" r:id="rId5"/>
-    <p:sldId id="314" r:id="rId6"/>
-    <p:sldId id="315" r:id="rId7"/>
-    <p:sldId id="316" r:id="rId8"/>
-    <p:sldId id="320" r:id="rId9"/>
-    <p:sldId id="321" r:id="rId10"/>
-    <p:sldId id="318" r:id="rId11"/>
-    <p:sldId id="325" r:id="rId12"/>
-    <p:sldId id="319" r:id="rId13"/>
-    <p:sldId id="323" r:id="rId14"/>
-    <p:sldId id="324" r:id="rId15"/>
-    <p:sldId id="279" r:id="rId16"/>
-    <p:sldId id="326" r:id="rId17"/>
-    <p:sldId id="328" r:id="rId18"/>
-    <p:sldId id="327" r:id="rId19"/>
-    <p:sldId id="329" r:id="rId20"/>
-    <p:sldId id="280" r:id="rId21"/>
-    <p:sldId id="331" r:id="rId22"/>
-    <p:sldId id="330" r:id="rId23"/>
-    <p:sldId id="332" r:id="rId24"/>
-    <p:sldId id="333" r:id="rId25"/>
-    <p:sldId id="283" r:id="rId26"/>
-    <p:sldId id="286" r:id="rId27"/>
+    <p:sldId id="275" r:id="rId4"/>
+    <p:sldId id="314" r:id="rId5"/>
+    <p:sldId id="315" r:id="rId6"/>
+    <p:sldId id="316" r:id="rId7"/>
+    <p:sldId id="320" r:id="rId8"/>
+    <p:sldId id="321" r:id="rId9"/>
+    <p:sldId id="318" r:id="rId10"/>
+    <p:sldId id="325" r:id="rId11"/>
+    <p:sldId id="319" r:id="rId12"/>
+    <p:sldId id="323" r:id="rId13"/>
+    <p:sldId id="324" r:id="rId14"/>
+    <p:sldId id="279" r:id="rId15"/>
+    <p:sldId id="326" r:id="rId16"/>
+    <p:sldId id="328" r:id="rId17"/>
+    <p:sldId id="327" r:id="rId18"/>
+    <p:sldId id="335" r:id="rId19"/>
+    <p:sldId id="280" r:id="rId20"/>
+    <p:sldId id="331" r:id="rId21"/>
+    <p:sldId id="330" r:id="rId22"/>
+    <p:sldId id="332" r:id="rId23"/>
+    <p:sldId id="333" r:id="rId24"/>
+    <p:sldId id="283" r:id="rId25"/>
+    <p:sldId id="286" r:id="rId26"/>
+    <p:sldId id="336" r:id="rId27"/>
     <p:sldId id="287" r:id="rId28"/>
     <p:sldId id="290" r:id="rId29"/>
     <p:sldId id="291" r:id="rId30"/>
     <p:sldId id="292" r:id="rId31"/>
     <p:sldId id="293" r:id="rId32"/>
-    <p:sldId id="301" r:id="rId33"/>
-    <p:sldId id="300" r:id="rId34"/>
-    <p:sldId id="302" r:id="rId35"/>
-    <p:sldId id="307" r:id="rId36"/>
-    <p:sldId id="308" r:id="rId37"/>
-    <p:sldId id="295" r:id="rId38"/>
+    <p:sldId id="337" r:id="rId33"/>
+    <p:sldId id="301" r:id="rId34"/>
+    <p:sldId id="300" r:id="rId35"/>
+    <p:sldId id="302" r:id="rId36"/>
+    <p:sldId id="307" r:id="rId37"/>
+    <p:sldId id="334" r:id="rId38"/>
+    <p:sldId id="295" r:id="rId39"/>
   </p:sldIdLst>
   <p:sldSz cx="9144000" cy="6858000" type="screen4x3"/>
   <p:notesSz cx="7010400" cy="9296400"/>
   <p:custDataLst>
-    <p:tags r:id="rId41"/>
+    <p:tags r:id="rId42"/>
   </p:custDataLst>
   <p:defaultTextStyle>
     <a:defPPr>
@@ -874,7 +875,7 @@
               <a:pPr>
                 <a:defRPr/>
               </a:pPr>
-              <a:t>7</a:t>
+              <a:t>6</a:t>
             </a:fld>
             <a:endParaRPr lang="en-US" dirty="0" smtClean="0">
               <a:solidFill>
@@ -4884,82 +4885,9 @@
           <a:chExt cx="0" cy="0"/>
         </a:xfrm>
       </p:grpSpPr>
-      <p:sp>
-        <p:nvSpPr>
-          <p:cNvPr id="5" name="TextBox 4"/>
-          <p:cNvSpPr txBox="1"/>
-          <p:nvPr/>
-        </p:nvSpPr>
-        <p:spPr>
-          <a:xfrm>
-            <a:off x="0" y="6243642"/>
-            <a:ext cx="8886825" cy="550068"/>
-          </a:xfrm>
-          <a:prstGeom prst="rect">
-            <a:avLst/>
-          </a:prstGeom>
-          <a:solidFill>
-            <a:schemeClr val="bg1"/>
-          </a:solidFill>
-        </p:spPr>
-        <p:txBody>
-          <a:bodyPr wrap="square" rtlCol="0">
-            <a:noAutofit/>
-          </a:bodyPr>
-          <a:lstStyle/>
-          <a:p>
-            <a:endParaRPr lang="en-US" dirty="0"/>
-          </a:p>
-        </p:txBody>
-      </p:sp>
-      <p:sp>
-        <p:nvSpPr>
-          <p:cNvPr id="4" name="Title 3"/>
-          <p:cNvSpPr>
-            <a:spLocks noGrp="1"/>
-          </p:cNvSpPr>
-          <p:nvPr>
-            <p:ph type="title"/>
-          </p:nvPr>
-        </p:nvSpPr>
-        <p:spPr>
-          <a:xfrm>
-            <a:off x="428625" y="153194"/>
-            <a:ext cx="8229600" cy="704055"/>
-          </a:xfrm>
-        </p:spPr>
-        <p:txBody>
-          <a:bodyPr>
-            <a:normAutofit fontScale="90000"/>
-          </a:bodyPr>
-          <a:lstStyle/>
-          <a:p>
-            <a:r>
-              <a:rPr lang="en-US" sz="3200" dirty="0" smtClean="0"/>
-              <a:t>C66 Core Prime </a:t>
-            </a:r>
-            <a:r>
-              <a:rPr lang="en-US" sz="3200" dirty="0"/>
-              <a:t>Event </a:t>
-            </a:r>
-            <a:r>
-              <a:rPr lang="en-US" sz="3200" dirty="0" smtClean="0"/>
-              <a:t>IDs</a:t>
-            </a:r>
-            <a:br>
-              <a:rPr lang="en-US" sz="3200" dirty="0" smtClean="0"/>
-            </a:br>
-            <a:r>
-              <a:rPr lang="en-US" sz="3200" dirty="0" smtClean="0"/>
-              <a:t>(Core Events Only)</a:t>
-            </a:r>
-            <a:endParaRPr lang="en-US" sz="3600" dirty="0"/>
-          </a:p>
-        </p:txBody>
-      </p:sp>
       <p:pic>
         <p:nvPicPr>
-          <p:cNvPr id="3075" name="Picture 3"/>
+          <p:cNvPr id="5122" name="Picture 2"/>
           <p:cNvPicPr>
             <a:picLocks noChangeAspect="1" noChangeArrowheads="1"/>
           </p:cNvPicPr>
@@ -4967,15 +4895,15 @@
         </p:nvPicPr>
         <p:blipFill>
           <a:blip r:embed="rId2" cstate="print"/>
-          <a:srcRect l="3504" r="18686"/>
+          <a:srcRect/>
           <a:stretch>
             <a:fillRect/>
           </a:stretch>
         </p:blipFill>
         <p:spPr bwMode="auto">
           <a:xfrm>
-            <a:off x="400049" y="952895"/>
-            <a:ext cx="4578073" cy="5847953"/>
+            <a:off x="1245326" y="948692"/>
+            <a:ext cx="6784249" cy="5652133"/>
           </a:xfrm>
           <a:prstGeom prst="rect">
             <a:avLst/>
@@ -4991,100 +4919,55 @@
       </p:pic>
       <p:sp>
         <p:nvSpPr>
-          <p:cNvPr id="6" name="TextBox 5"/>
-          <p:cNvSpPr txBox="1"/>
+          <p:cNvPr id="3" name="Rectangle 2"/>
+          <p:cNvSpPr/>
           <p:nvPr/>
         </p:nvSpPr>
         <p:spPr>
           <a:xfrm>
-            <a:off x="5150644" y="1143000"/>
-            <a:ext cx="3764756" cy="2585323"/>
+            <a:off x="472314" y="3916428"/>
+            <a:ext cx="7315200" cy="1600200"/>
           </a:xfrm>
           <a:prstGeom prst="rect">
             <a:avLst/>
           </a:prstGeom>
-          <a:noFill/>
+          <a:solidFill>
+            <a:srgbClr val="FFFF00">
+              <a:alpha val="23000"/>
+            </a:srgbClr>
+          </a:solidFill>
+          <a:ln>
+            <a:noFill/>
+          </a:ln>
         </p:spPr>
-        <p:txBody>
-          <a:bodyPr wrap="square" rtlCol="0">
-            <a:spAutoFit/>
-          </a:bodyPr>
+        <p:style>
+          <a:lnRef idx="2">
+            <a:schemeClr val="accent1">
+              <a:shade val="50000"/>
+            </a:schemeClr>
+          </a:lnRef>
+          <a:fillRef idx="1">
+            <a:schemeClr val="accent1"/>
+          </a:fillRef>
+          <a:effectRef idx="0">
+            <a:schemeClr val="accent1"/>
+          </a:effectRef>
+          <a:fontRef idx="minor">
+            <a:schemeClr val="lt1"/>
+          </a:fontRef>
+        </p:style>
+        <p:txBody>
+          <a:bodyPr rtlCol="0" anchor="ctr"/>
           <a:lstStyle/>
           <a:p>
-            <a:r>
-              <a:rPr lang="en-US" dirty="0" smtClean="0"/>
-              <a:t>From the C66x User’s Guide:</a:t>
-            </a:r>
-          </a:p>
-          <a:p>
-            <a:pPr marL="342900" indent="-342900">
-              <a:buFont typeface="Arial" pitchFamily="34" charset="0"/>
-              <a:buChar char="•"/>
-            </a:pPr>
-            <a:r>
-              <a:rPr lang="en-US" dirty="0" smtClean="0"/>
-              <a:t>22 assigned events</a:t>
-            </a:r>
-          </a:p>
-          <a:p>
-            <a:pPr marL="800100" lvl="1" indent="-342900">
-              <a:buFont typeface="Arial" pitchFamily="34" charset="0"/>
-              <a:buChar char="•"/>
-            </a:pPr>
-            <a:r>
-              <a:rPr lang="en-US" dirty="0" smtClean="0"/>
-              <a:t>5 reserve primary events</a:t>
-            </a:r>
-          </a:p>
-          <a:p>
-            <a:pPr marL="800100" lvl="1" indent="-342900">
-              <a:buFont typeface="Arial" pitchFamily="34" charset="0"/>
-              <a:buChar char="•"/>
-            </a:pPr>
-            <a:r>
-              <a:rPr lang="en-US" dirty="0" smtClean="0"/>
-              <a:t>17 secondary events</a:t>
-            </a:r>
-          </a:p>
-          <a:p>
-            <a:pPr marL="342900" indent="-342900">
-              <a:buFont typeface="Arial" pitchFamily="34" charset="0"/>
-              <a:buChar char="•"/>
-            </a:pPr>
-            <a:r>
-              <a:rPr lang="en-US" dirty="0" smtClean="0"/>
-              <a:t>7 reserved events</a:t>
-            </a:r>
-          </a:p>
-          <a:p>
-            <a:pPr marL="342900" indent="-342900">
-              <a:buFont typeface="Arial" pitchFamily="34" charset="0"/>
-              <a:buChar char="•"/>
-            </a:pPr>
-            <a:r>
-              <a:rPr lang="en-US" dirty="0" smtClean="0"/>
-              <a:t>99 Available events</a:t>
-            </a:r>
-          </a:p>
-          <a:p>
-            <a:pPr marL="342900" indent="-342900">
-              <a:buFont typeface="Arial" pitchFamily="34" charset="0"/>
-              <a:buChar char="•"/>
-            </a:pPr>
-            <a:r>
-              <a:rPr lang="en-US" dirty="0" smtClean="0"/>
-              <a:t>The available events are connected to the device.</a:t>
-            </a:r>
-            <a:br>
-              <a:rPr lang="en-US" dirty="0" smtClean="0"/>
-            </a:br>
-            <a:endParaRPr lang="en-US" dirty="0" smtClean="0"/>
-          </a:p>
-        </p:txBody>
-      </p:sp>
-      <p:sp>
-        <p:nvSpPr>
-          <p:cNvPr id="7" name="Slide Number Placeholder 6"/>
+            <a:pPr algn="ctr"/>
+            <a:endParaRPr lang="en-US" dirty="0"/>
+          </a:p>
+        </p:txBody>
+      </p:sp>
+      <p:sp>
+        <p:nvSpPr>
+          <p:cNvPr id="4" name="Slide Number Placeholder 3"/>
           <p:cNvSpPr>
             <a:spLocks noGrp="1"/>
           </p:cNvSpPr>
@@ -5106,10 +4989,47 @@
           </a:p>
         </p:txBody>
       </p:sp>
+      <p:sp>
+        <p:nvSpPr>
+          <p:cNvPr id="5" name="Title 3"/>
+          <p:cNvSpPr>
+            <a:spLocks noGrp="1"/>
+          </p:cNvSpPr>
+          <p:nvPr>
+            <p:ph type="title"/>
+          </p:nvPr>
+        </p:nvSpPr>
+        <p:spPr>
+          <a:xfrm>
+            <a:off x="457200" y="103188"/>
+            <a:ext cx="8229600" cy="776378"/>
+          </a:xfrm>
+        </p:spPr>
+        <p:txBody>
+          <a:bodyPr>
+            <a:normAutofit fontScale="90000"/>
+          </a:bodyPr>
+          <a:lstStyle/>
+          <a:p>
+            <a:r>
+              <a:rPr lang="en-US" sz="3600" dirty="0"/>
+              <a:t>C66 Core Prime Event IDs</a:t>
+            </a:r>
+            <a:br>
+              <a:rPr lang="en-US" sz="3600" dirty="0"/>
+            </a:br>
+            <a:r>
+              <a:rPr lang="en-US" sz="3600" dirty="0" smtClean="0"/>
+              <a:t>When it is part of KeyStone 2 Device</a:t>
+            </a:r>
+            <a:endParaRPr lang="en-US" sz="3600" dirty="0"/>
+          </a:p>
+        </p:txBody>
+      </p:sp>
     </p:spTree>
     <p:extLst>
       <p:ext uri="{BB962C8B-B14F-4D97-AF65-F5344CB8AC3E}">
-        <p14:creationId xmlns:p14="http://schemas.microsoft.com/office/powerpoint/2010/main" val="1238034943"/>
+        <p14:creationId xmlns:p14="http://schemas.microsoft.com/office/powerpoint/2010/main" val="3024861948"/>
       </p:ext>
     </p:extLst>
   </p:cSld>
@@ -5143,184 +5063,6 @@
           <a:chExt cx="0" cy="0"/>
         </a:xfrm>
       </p:grpSpPr>
-      <p:pic>
-        <p:nvPicPr>
-          <p:cNvPr id="5122" name="Picture 2"/>
-          <p:cNvPicPr>
-            <a:picLocks noChangeAspect="1" noChangeArrowheads="1"/>
-          </p:cNvPicPr>
-          <p:nvPr/>
-        </p:nvPicPr>
-        <p:blipFill>
-          <a:blip r:embed="rId2" cstate="print"/>
-          <a:srcRect/>
-          <a:stretch>
-            <a:fillRect/>
-          </a:stretch>
-        </p:blipFill>
-        <p:spPr bwMode="auto">
-          <a:xfrm>
-            <a:off x="1245326" y="948692"/>
-            <a:ext cx="6784249" cy="5652133"/>
-          </a:xfrm>
-          <a:prstGeom prst="rect">
-            <a:avLst/>
-          </a:prstGeom>
-          <a:noFill/>
-          <a:ln w="9525">
-            <a:noFill/>
-            <a:miter lim="800000"/>
-            <a:headEnd/>
-            <a:tailEnd/>
-          </a:ln>
-        </p:spPr>
-      </p:pic>
-      <p:sp>
-        <p:nvSpPr>
-          <p:cNvPr id="3" name="Rectangle 2"/>
-          <p:cNvSpPr/>
-          <p:nvPr/>
-        </p:nvSpPr>
-        <p:spPr>
-          <a:xfrm>
-            <a:off x="472314" y="3916428"/>
-            <a:ext cx="7315200" cy="1600200"/>
-          </a:xfrm>
-          <a:prstGeom prst="rect">
-            <a:avLst/>
-          </a:prstGeom>
-          <a:solidFill>
-            <a:srgbClr val="FFFF00">
-              <a:alpha val="23000"/>
-            </a:srgbClr>
-          </a:solidFill>
-          <a:ln>
-            <a:noFill/>
-          </a:ln>
-        </p:spPr>
-        <p:style>
-          <a:lnRef idx="2">
-            <a:schemeClr val="accent1">
-              <a:shade val="50000"/>
-            </a:schemeClr>
-          </a:lnRef>
-          <a:fillRef idx="1">
-            <a:schemeClr val="accent1"/>
-          </a:fillRef>
-          <a:effectRef idx="0">
-            <a:schemeClr val="accent1"/>
-          </a:effectRef>
-          <a:fontRef idx="minor">
-            <a:schemeClr val="lt1"/>
-          </a:fontRef>
-        </p:style>
-        <p:txBody>
-          <a:bodyPr rtlCol="0" anchor="ctr"/>
-          <a:lstStyle/>
-          <a:p>
-            <a:pPr algn="ctr"/>
-            <a:endParaRPr lang="en-US" dirty="0"/>
-          </a:p>
-        </p:txBody>
-      </p:sp>
-      <p:sp>
-        <p:nvSpPr>
-          <p:cNvPr id="4" name="Slide Number Placeholder 3"/>
-          <p:cNvSpPr>
-            <a:spLocks noGrp="1"/>
-          </p:cNvSpPr>
-          <p:nvPr>
-            <p:ph type="sldNum" sz="quarter" idx="10"/>
-          </p:nvPr>
-        </p:nvSpPr>
-        <p:spPr/>
-        <p:txBody>
-          <a:bodyPr/>
-          <a:lstStyle/>
-          <a:p>
-            <a:fld id="{803D9FE4-F784-4A94-8F3E-54A098F0E8CC}" type="slidenum">
-              <a:rPr lang="en-US" smtClean="0"/>
-              <a:pPr/>
-              <a:t>11</a:t>
-            </a:fld>
-            <a:endParaRPr lang="en-US" dirty="0"/>
-          </a:p>
-        </p:txBody>
-      </p:sp>
-      <p:sp>
-        <p:nvSpPr>
-          <p:cNvPr id="5" name="Title 3"/>
-          <p:cNvSpPr>
-            <a:spLocks noGrp="1"/>
-          </p:cNvSpPr>
-          <p:nvPr>
-            <p:ph type="title"/>
-          </p:nvPr>
-        </p:nvSpPr>
-        <p:spPr>
-          <a:xfrm>
-            <a:off x="457200" y="103188"/>
-            <a:ext cx="8229600" cy="776378"/>
-          </a:xfrm>
-        </p:spPr>
-        <p:txBody>
-          <a:bodyPr>
-            <a:normAutofit fontScale="90000"/>
-          </a:bodyPr>
-          <a:lstStyle/>
-          <a:p>
-            <a:r>
-              <a:rPr lang="en-US" sz="3600" dirty="0"/>
-              <a:t>C66 Core Prime Event IDs</a:t>
-            </a:r>
-            <a:br>
-              <a:rPr lang="en-US" sz="3600" dirty="0"/>
-            </a:br>
-            <a:r>
-              <a:rPr lang="en-US" sz="3600" dirty="0" smtClean="0"/>
-              <a:t>When it is part of KeyStone 2 Device</a:t>
-            </a:r>
-            <a:endParaRPr lang="en-US" sz="3600" dirty="0"/>
-          </a:p>
-        </p:txBody>
-      </p:sp>
-    </p:spTree>
-    <p:extLst>
-      <p:ext uri="{BB962C8B-B14F-4D97-AF65-F5344CB8AC3E}">
-        <p14:creationId xmlns:p14="http://schemas.microsoft.com/office/powerpoint/2010/main" val="3024861948"/>
-      </p:ext>
-    </p:extLst>
-  </p:cSld>
-  <p:clrMapOvr>
-    <a:masterClrMapping/>
-  </p:clrMapOvr>
-  <p:timing>
-    <p:tnLst>
-      <p:par>
-        <p:cTn id="1" dur="indefinite" restart="never" nodeType="tmRoot"/>
-      </p:par>
-    </p:tnLst>
-  </p:timing>
-</p:sld>
-</file>
-
-<file path=ppt/slides/slide12.xml><?xml version="1.0" encoding="utf-8"?>
-<p:sld xmlns:a="http://schemas.openxmlformats.org/drawingml/2006/main" xmlns:r="http://schemas.openxmlformats.org/officeDocument/2006/relationships" xmlns:p="http://schemas.openxmlformats.org/presentationml/2006/main">
-  <p:cSld>
-    <p:spTree>
-      <p:nvGrpSpPr>
-        <p:cNvPr id="1" name=""/>
-        <p:cNvGrpSpPr/>
-        <p:nvPr/>
-      </p:nvGrpSpPr>
-      <p:grpSpPr>
-        <a:xfrm>
-          <a:off x="0" y="0"/>
-          <a:ext cx="0" cy="0"/>
-          <a:chOff x="0" y="0"/>
-          <a:chExt cx="0" cy="0"/>
-        </a:xfrm>
-      </p:grpSpPr>
       <p:sp>
         <p:nvSpPr>
           <p:cNvPr id="2" name="Title 1"/>
@@ -5367,7 +5109,7 @@
             <a:fld id="{803D9FE4-F784-4A94-8F3E-54A098F0E8CC}" type="slidenum">
               <a:rPr lang="en-US" smtClean="0"/>
               <a:pPr/>
-              <a:t>12</a:t>
+              <a:t>11</a:t>
             </a:fld>
             <a:endParaRPr lang="en-US" dirty="0"/>
           </a:p>
@@ -5382,7 +5124,7 @@
         <p:spPr>
           <a:xfrm>
             <a:off x="314325" y="1171575"/>
-            <a:ext cx="8321509" cy="4247317"/>
+            <a:ext cx="8411277" cy="4524315"/>
           </a:xfrm>
           <a:prstGeom prst="rect">
             <a:avLst/>
@@ -5545,8 +5287,31 @@
             </a:pPr>
             <a:r>
               <a:rPr lang="en-US" dirty="0" smtClean="0"/>
-              <a:t>Enable the particular interrupt</a:t>
-            </a:r>
+              <a:t>Enable the particular </a:t>
+            </a:r>
+            <a:r>
+              <a:rPr lang="en-US" dirty="0" smtClean="0"/>
+              <a:t>interrupt</a:t>
+            </a:r>
+          </a:p>
+          <a:p>
+            <a:pPr marL="285750" indent="-285750">
+              <a:buFont typeface="Arial" panose="020B0604020202020204" pitchFamily="34" charset="0"/>
+              <a:buChar char="•"/>
+            </a:pPr>
+            <a:r>
+              <a:rPr lang="en-US" dirty="0" smtClean="0">
+                <a:solidFill>
+                  <a:schemeClr val="tx2"/>
+                </a:solidFill>
+              </a:rPr>
+              <a:t>This presentation will not get into details of enabling the interrupts</a:t>
+            </a:r>
+            <a:endParaRPr lang="en-US" dirty="0" smtClean="0">
+              <a:solidFill>
+                <a:schemeClr val="tx2"/>
+              </a:solidFill>
+            </a:endParaRPr>
           </a:p>
           <a:p>
             <a:pPr marL="742950" lvl="1" indent="-285750">
@@ -5577,7 +5342,7 @@
 </p:sld>
 </file>
 
-<file path=ppt/slides/slide13.xml><?xml version="1.0" encoding="utf-8"?>
+<file path=ppt/slides/slide12.xml><?xml version="1.0" encoding="utf-8"?>
 <p:sld xmlns:a="http://schemas.openxmlformats.org/drawingml/2006/main" xmlns:r="http://schemas.openxmlformats.org/officeDocument/2006/relationships" xmlns:p="http://schemas.openxmlformats.org/presentationml/2006/main">
   <p:cSld>
     <p:spTree>
@@ -8629,7 +8394,7 @@
             <a:fld id="{803D9FE4-F784-4A94-8F3E-54A098F0E8CC}" type="slidenum">
               <a:rPr lang="en-US" smtClean="0"/>
               <a:pPr/>
-              <a:t>13</a:t>
+              <a:t>12</a:t>
             </a:fld>
             <a:endParaRPr lang="en-US" dirty="0"/>
           </a:p>
@@ -8655,7 +8420,7 @@
 </p:sld>
 </file>
 
-<file path=ppt/slides/slide14.xml><?xml version="1.0" encoding="utf-8"?>
+<file path=ppt/slides/slide13.xml><?xml version="1.0" encoding="utf-8"?>
 <p:sld xmlns:a="http://schemas.openxmlformats.org/drawingml/2006/main" xmlns:r="http://schemas.openxmlformats.org/officeDocument/2006/relationships" xmlns:p="http://schemas.openxmlformats.org/presentationml/2006/main">
   <p:cSld>
     <p:spTree>
@@ -8724,7 +8489,7 @@
           <a:graphicData uri="http://schemas.openxmlformats.org/presentationml/2006/ole">
             <mc:AlternateContent xmlns:mc="http://schemas.openxmlformats.org/markup-compatibility/2006">
               <mc:Choice xmlns:v="urn:schemas-microsoft-com:vml" Requires="v">
-                <p:oleObj spid="_x0000_s10250" name="Visio" r:id="rId3" imgW="9044738" imgH="6169084" progId="Visio.Drawing.11">
+                <p:oleObj spid="_x0000_s10253" name="Visio" r:id="rId3" imgW="9044738" imgH="6169084" progId="Visio.Drawing.11">
                   <p:embed/>
                 </p:oleObj>
               </mc:Choice>
@@ -8779,7 +8544,7 @@
 </p:sld>
 </file>
 
-<file path=ppt/slides/slide15.xml><?xml version="1.0" encoding="utf-8"?>
+<file path=ppt/slides/slide14.xml><?xml version="1.0" encoding="utf-8"?>
 <p:sld xmlns:a="http://schemas.openxmlformats.org/drawingml/2006/main" xmlns:r="http://schemas.openxmlformats.org/officeDocument/2006/relationships" xmlns:p="http://schemas.openxmlformats.org/presentationml/2006/main">
   <p:cSld>
     <p:spTree>
@@ -8899,7 +8664,7 @@
             <a:fld id="{803D9FE4-F784-4A94-8F3E-54A098F0E8CC}" type="slidenum">
               <a:rPr lang="en-US" smtClean="0"/>
               <a:pPr/>
-              <a:t>15</a:t>
+              <a:t>14</a:t>
             </a:fld>
             <a:endParaRPr lang="en-US" dirty="0"/>
           </a:p>
@@ -8955,15 +8720,7 @@
                   <a:schemeClr val="tx1"/>
                 </a:solidFill>
               </a:rPr>
-              <a:t>Event</a:t>
-            </a:r>
-            <a:r>
-              <a:rPr lang="en-US" sz="2700" dirty="0" smtClean="0">
-                <a:solidFill>
-                  <a:schemeClr val="tx1"/>
-                </a:solidFill>
-              </a:rPr>
-              <a:t> name – the CIC output line</a:t>
+              <a:t>Event name – the CIC output line</a:t>
             </a:r>
             <a:endParaRPr lang="en-US" sz="2700" dirty="0">
               <a:solidFill>
@@ -8995,7 +8752,7 @@
           <a:graphicData uri="http://schemas.openxmlformats.org/presentationml/2006/ole">
             <mc:AlternateContent xmlns:mc="http://schemas.openxmlformats.org/markup-compatibility/2006">
               <mc:Choice xmlns:v="urn:schemas-microsoft-com:vml" Requires="v">
-                <p:oleObj spid="_x0000_s11273" name="Visio" r:id="rId4" imgW="9044738" imgH="6169084" progId="Visio.Drawing.11">
+                <p:oleObj spid="_x0000_s11276" name="Visio" r:id="rId4" imgW="9044738" imgH="6169084" progId="Visio.Drawing.11">
                   <p:embed/>
                 </p:oleObj>
               </mc:Choice>
@@ -9512,7 +9269,7 @@
           <a:lstStyle/>
           <a:p>
             <a:pPr algn="ctr"/>
-            <a:endParaRPr lang="en-US"/>
+            <a:endParaRPr lang="en-US" dirty="0"/>
           </a:p>
         </p:txBody>
       </p:sp>
@@ -9711,7 +9468,7 @@
           <a:lstStyle/>
           <a:p>
             <a:pPr algn="ctr"/>
-            <a:endParaRPr lang="en-US"/>
+            <a:endParaRPr lang="en-US" dirty="0"/>
           </a:p>
         </p:txBody>
       </p:sp>
@@ -10126,7 +9883,7 @@
           <a:lstStyle/>
           <a:p>
             <a:pPr algn="ctr"/>
-            <a:endParaRPr lang="en-US"/>
+            <a:endParaRPr lang="en-US" dirty="0"/>
           </a:p>
         </p:txBody>
       </p:sp>
@@ -10365,7 +10122,7 @@
           <a:lstStyle/>
           <a:p>
             <a:pPr algn="ctr"/>
-            <a:endParaRPr lang="en-US"/>
+            <a:endParaRPr lang="en-US" dirty="0"/>
           </a:p>
         </p:txBody>
       </p:sp>
@@ -10384,7 +10141,7 @@
 </p:sld>
 </file>
 
-<file path=ppt/slides/slide16.xml><?xml version="1.0" encoding="utf-8"?>
+<file path=ppt/slides/slide15.xml><?xml version="1.0" encoding="utf-8"?>
 <p:sld xmlns:a="http://schemas.openxmlformats.org/drawingml/2006/main" xmlns:r="http://schemas.openxmlformats.org/officeDocument/2006/relationships" xmlns:p="http://schemas.openxmlformats.org/presentationml/2006/main">
   <p:cSld>
     <p:spTree>
@@ -10449,7 +10206,7 @@
             <a:fld id="{3B20521C-F793-4067-BB07-C7AF74E21EF3}" type="slidenum">
               <a:rPr lang="en-US" smtClean="0"/>
               <a:pPr/>
-              <a:t>16</a:t>
+              <a:t>15</a:t>
             </a:fld>
             <a:endParaRPr lang="en-US" dirty="0"/>
           </a:p>
@@ -10477,7 +10234,7 @@
           <a:graphicData uri="http://schemas.openxmlformats.org/presentationml/2006/ole">
             <mc:AlternateContent xmlns:mc="http://schemas.openxmlformats.org/markup-compatibility/2006">
               <mc:Choice xmlns:v="urn:schemas-microsoft-com:vml" Requires="v">
-                <p:oleObj spid="_x0000_s12294" name="Visio" r:id="rId3" imgW="9044738" imgH="6169084" progId="Visio.Drawing.11">
+                <p:oleObj spid="_x0000_s12297" name="Visio" r:id="rId3" imgW="9044738" imgH="6169084" progId="Visio.Drawing.11">
                   <p:embed/>
                 </p:oleObj>
               </mc:Choice>
@@ -10589,7 +10346,7 @@
 </p:sld>
 </file>
 
-<file path=ppt/slides/slide17.xml><?xml version="1.0" encoding="utf-8"?>
+<file path=ppt/slides/slide16.xml><?xml version="1.0" encoding="utf-8"?>
 <p:sld xmlns:a="http://schemas.openxmlformats.org/drawingml/2006/main" xmlns:r="http://schemas.openxmlformats.org/officeDocument/2006/relationships" xmlns:p="http://schemas.openxmlformats.org/presentationml/2006/main">
   <p:cSld>
     <p:spTree>
@@ -10704,7 +10461,7 @@
             <a:fld id="{803D9FE4-F784-4A94-8F3E-54A098F0E8CC}" type="slidenum">
               <a:rPr lang="en-US" smtClean="0"/>
               <a:pPr/>
-              <a:t>17</a:t>
+              <a:t>16</a:t>
             </a:fld>
             <a:endParaRPr lang="en-US" dirty="0"/>
           </a:p>
@@ -10734,11 +10491,7 @@
           <a:p>
             <a:r>
               <a:rPr lang="en-US" sz="3600" dirty="0" smtClean="0"/>
-              <a:t>KeyStone II CIC input </a:t>
-            </a:r>
-            <a:r>
-              <a:rPr lang="en-US" sz="3600" dirty="0" smtClean="0"/>
-              <a:t>system events</a:t>
+              <a:t>KeyStone II CIC input system events</a:t>
             </a:r>
             <a:endParaRPr lang="en-US" sz="3600" dirty="0"/>
           </a:p>
@@ -10748,6 +10501,162 @@
     <p:extLst>
       <p:ext uri="{BB962C8B-B14F-4D97-AF65-F5344CB8AC3E}">
         <p14:creationId xmlns:p14="http://schemas.microsoft.com/office/powerpoint/2010/main" val="2577305559"/>
+      </p:ext>
+    </p:extLst>
+  </p:cSld>
+  <p:clrMapOvr>
+    <a:masterClrMapping/>
+  </p:clrMapOvr>
+  <p:timing>
+    <p:tnLst>
+      <p:par>
+        <p:cTn id="1" dur="indefinite" restart="never" nodeType="tmRoot"/>
+      </p:par>
+    </p:tnLst>
+  </p:timing>
+</p:sld>
+</file>
+
+<file path=ppt/slides/slide17.xml><?xml version="1.0" encoding="utf-8"?>
+<p:sld xmlns:a="http://schemas.openxmlformats.org/drawingml/2006/main" xmlns:r="http://schemas.openxmlformats.org/officeDocument/2006/relationships" xmlns:p="http://schemas.openxmlformats.org/presentationml/2006/main">
+  <p:cSld>
+    <p:spTree>
+      <p:nvGrpSpPr>
+        <p:cNvPr id="1" name=""/>
+        <p:cNvGrpSpPr/>
+        <p:nvPr/>
+      </p:nvGrpSpPr>
+      <p:grpSpPr>
+        <a:xfrm>
+          <a:off x="0" y="0"/>
+          <a:ext cx="0" cy="0"/>
+          <a:chOff x="0" y="0"/>
+          <a:chExt cx="0" cy="0"/>
+        </a:xfrm>
+      </p:grpSpPr>
+      <p:sp>
+        <p:nvSpPr>
+          <p:cNvPr id="2" name="Title 1"/>
+          <p:cNvSpPr>
+            <a:spLocks noGrp="1"/>
+          </p:cNvSpPr>
+          <p:nvPr>
+            <p:ph type="title"/>
+          </p:nvPr>
+        </p:nvSpPr>
+        <p:spPr>
+          <a:xfrm>
+            <a:off x="457200" y="274638"/>
+            <a:ext cx="8229600" cy="715962"/>
+          </a:xfrm>
+        </p:spPr>
+        <p:txBody>
+          <a:bodyPr>
+            <a:normAutofit/>
+          </a:bodyPr>
+          <a:lstStyle/>
+          <a:p>
+            <a:r>
+              <a:rPr lang="en-US" sz="3600" dirty="0" smtClean="0"/>
+              <a:t>Mapping CIC -  API</a:t>
+            </a:r>
+            <a:endParaRPr lang="en-US" sz="3600" dirty="0"/>
+          </a:p>
+        </p:txBody>
+      </p:sp>
+      <p:sp>
+        <p:nvSpPr>
+          <p:cNvPr id="3" name="Content Placeholder 2"/>
+          <p:cNvSpPr>
+            <a:spLocks noGrp="1"/>
+          </p:cNvSpPr>
+          <p:nvPr>
+            <p:ph idx="1"/>
+          </p:nvPr>
+        </p:nvSpPr>
+        <p:spPr/>
+        <p:txBody>
+          <a:bodyPr>
+            <a:normAutofit/>
+          </a:bodyPr>
+          <a:lstStyle/>
+          <a:p>
+            <a:r>
+              <a:rPr lang="en-US" sz="2800" dirty="0" smtClean="0"/>
+              <a:t>Read the following Wiki: </a:t>
+            </a:r>
+            <a:r>
+              <a:rPr lang="en-US" sz="1600" i="1" dirty="0" smtClean="0">
+                <a:hlinkClick r:id="rId2"/>
+              </a:rPr>
+              <a:t>http://processors.wiki.ti.com/index.php/Configuring_Interrupts_on_Keystone_Devices</a:t>
+            </a:r>
+            <a:endParaRPr lang="en-US" sz="1600" i="1" dirty="0" smtClean="0"/>
+          </a:p>
+          <a:p>
+            <a:r>
+              <a:rPr lang="en-US" sz="2800" dirty="0" smtClean="0"/>
+              <a:t>csl APIs- For KeyStone II (MCSDK 3.x), look at the two include files to see all the API that are needed:</a:t>
+            </a:r>
+          </a:p>
+          <a:p>
+            <a:pPr lvl="1"/>
+            <a:r>
+              <a:rPr lang="en-US" sz="2600" dirty="0" smtClean="0"/>
+              <a:t>csl_cpIntc.h</a:t>
+            </a:r>
+          </a:p>
+          <a:p>
+            <a:pPr lvl="1"/>
+            <a:r>
+              <a:rPr lang="en-US" sz="2600" dirty="0" smtClean="0"/>
+              <a:t>csl_cpIntCAux.h</a:t>
+            </a:r>
+          </a:p>
+          <a:p>
+            <a:r>
+              <a:rPr lang="en-US" sz="2800" dirty="0" smtClean="0"/>
+              <a:t>SysBios APIs – look at cpInitc.h and cpInitc.c </a:t>
+            </a:r>
+            <a:r>
+              <a:rPr lang="en-US" sz="2800" dirty="0"/>
+              <a:t>in directory </a:t>
+            </a:r>
+            <a:r>
+              <a:rPr lang="en-US" sz="2400" dirty="0" smtClean="0"/>
+              <a:t>MCSDK_Y_XX\bios_6_BB_AA_ZZ\packages\ti\sysbios\family\c66\tci66xx</a:t>
+            </a:r>
+          </a:p>
+        </p:txBody>
+      </p:sp>
+      <p:sp>
+        <p:nvSpPr>
+          <p:cNvPr id="4" name="Slide Number Placeholder 3"/>
+          <p:cNvSpPr>
+            <a:spLocks noGrp="1"/>
+          </p:cNvSpPr>
+          <p:nvPr>
+            <p:ph type="sldNum" sz="quarter" idx="10"/>
+          </p:nvPr>
+        </p:nvSpPr>
+        <p:spPr/>
+        <p:txBody>
+          <a:bodyPr/>
+          <a:lstStyle/>
+          <a:p>
+            <a:fld id="{3B20521C-F793-4067-BB07-C7AF74E21EF3}" type="slidenum">
+              <a:rPr lang="en-US" smtClean="0"/>
+              <a:pPr/>
+              <a:t>17</a:t>
+            </a:fld>
+            <a:endParaRPr lang="en-US" dirty="0"/>
+          </a:p>
+        </p:txBody>
+      </p:sp>
+    </p:spTree>
+    <p:extLst>
+      <p:ext uri="{BB962C8B-B14F-4D97-AF65-F5344CB8AC3E}">
+        <p14:creationId xmlns:p14="http://schemas.microsoft.com/office/powerpoint/2010/main" val="1259010899"/>
       </p:ext>
     </p:extLst>
   </p:cSld>
@@ -10805,15 +10714,7 @@
           <a:p>
             <a:r>
               <a:rPr lang="en-US" sz="3600" dirty="0" smtClean="0"/>
-              <a:t>Mapping CIC - </a:t>
-            </a:r>
-            <a:r>
-              <a:rPr lang="en-US" sz="3600" dirty="0" smtClean="0"/>
-              <a:t> </a:t>
-            </a:r>
-            <a:r>
-              <a:rPr lang="en-US" sz="3600" dirty="0" smtClean="0"/>
-              <a:t>API</a:t>
+              <a:t>Agenda</a:t>
             </a:r>
             <a:endParaRPr lang="en-US" sz="3600" dirty="0"/>
           </a:p>
@@ -10838,49 +10739,29 @@
           <a:p>
             <a:r>
               <a:rPr lang="en-US" sz="2800" dirty="0" smtClean="0"/>
-              <a:t>Read the following Wiki: </a:t>
-            </a:r>
-            <a:r>
-              <a:rPr lang="en-US" sz="1600" i="1" dirty="0" smtClean="0">
-                <a:hlinkClick r:id="rId2"/>
-              </a:rPr>
-              <a:t>http://processors.wiki.ti.com/index.php/Configuring_Interrupts_on_Keystone_Devices</a:t>
-            </a:r>
-            <a:endParaRPr lang="en-US" sz="1600" i="1" dirty="0" smtClean="0"/>
+              <a:t>Interrupt Scheme </a:t>
+            </a:r>
+            <a:endParaRPr lang="en-US" sz="2800" dirty="0"/>
+          </a:p>
+          <a:p>
+            <a:r>
+              <a:rPr lang="en-US" sz="2800" b="1" dirty="0" smtClean="0"/>
+              <a:t>Example 1 – SPI transmit Interrupt</a:t>
+            </a:r>
           </a:p>
           <a:p>
             <a:r>
               <a:rPr lang="en-US" sz="2800" dirty="0" smtClean="0"/>
-              <a:t>csl APIs- For KeyStone II (MCSDK 3.x), look at the two include files to see all the API that are needed:</a:t>
-            </a:r>
-          </a:p>
-          <a:p>
-            <a:pPr lvl="1"/>
-            <a:r>
-              <a:rPr lang="en-US" sz="2600" dirty="0" smtClean="0"/>
-              <a:t>csl_cpIntc.h</a:t>
-            </a:r>
-          </a:p>
-          <a:p>
-            <a:pPr lvl="1"/>
-            <a:r>
-              <a:rPr lang="en-US" sz="2600" dirty="0" smtClean="0"/>
-              <a:t>csl_cpIntCAux.h</a:t>
-            </a:r>
+              <a:t>Example 2 – Hyperlink interrupt</a:t>
+            </a:r>
+            <a:endParaRPr lang="en-US" sz="2800" dirty="0" smtClean="0"/>
           </a:p>
           <a:p>
             <a:r>
               <a:rPr lang="en-US" sz="2800" dirty="0" smtClean="0"/>
-              <a:t>SysBios APIs – look at cpInitc.h and cpInitc.c </a:t>
-            </a:r>
-            <a:r>
-              <a:rPr lang="en-US" sz="2800" dirty="0"/>
-              <a:t>in directory </a:t>
-            </a:r>
-            <a:r>
-              <a:rPr lang="en-US" sz="2400" dirty="0" smtClean="0"/>
-              <a:t>MCSDK_Y_XX\bios_6_BB_AA_ZZ\packages\ti\sysbios\family\c66\tci66xx</a:t>
-            </a:r>
+              <a:t>ARM interrupt scheme</a:t>
+            </a:r>
+            <a:endParaRPr lang="en-US" sz="2800" dirty="0" smtClean="0"/>
           </a:p>
         </p:txBody>
       </p:sp>
@@ -10911,20 +10792,13 @@
     </p:spTree>
     <p:extLst>
       <p:ext uri="{BB962C8B-B14F-4D97-AF65-F5344CB8AC3E}">
-        <p14:creationId xmlns:p14="http://schemas.microsoft.com/office/powerpoint/2010/main" val="1259010899"/>
+        <p14:creationId xmlns:p14="http://schemas.microsoft.com/office/powerpoint/2010/main" val="1427989494"/>
       </p:ext>
     </p:extLst>
   </p:cSld>
   <p:clrMapOvr>
     <a:masterClrMapping/>
   </p:clrMapOvr>
-  <p:timing>
-    <p:tnLst>
-      <p:par>
-        <p:cTn id="1" dur="indefinite" restart="never" nodeType="tmRoot"/>
-      </p:par>
-    </p:tnLst>
-  </p:timing>
 </p:sld>
 </file>
 
@@ -10958,7 +10832,7 @@
         <p:spPr>
           <a:xfrm>
             <a:off x="457200" y="274638"/>
-            <a:ext cx="8229600" cy="715962"/>
+            <a:ext cx="8229600" cy="1477962"/>
           </a:xfrm>
         </p:spPr>
         <p:txBody>
@@ -10968,10 +10842,25 @@
           <a:lstStyle/>
           <a:p>
             <a:r>
-              <a:rPr lang="en-US" dirty="0" smtClean="0"/>
-              <a:t>Example 1</a:t>
-            </a:r>
-            <a:endParaRPr lang="en-US" dirty="0"/>
+              <a:rPr lang="en-US" sz="3600" dirty="0" smtClean="0"/>
+              <a:t>Example 1 – </a:t>
+            </a:r>
+            <a:r>
+              <a:rPr lang="en-US" sz="3600" dirty="0" smtClean="0"/>
+              <a:t/>
+            </a:r>
+            <a:br>
+              <a:rPr lang="en-US" sz="3600" dirty="0" smtClean="0"/>
+            </a:br>
+            <a:r>
+              <a:rPr lang="en-US" sz="3600" dirty="0" smtClean="0"/>
+              <a:t>connected ISR to </a:t>
+            </a:r>
+            <a:r>
+              <a:rPr lang="en-US" sz="3600" dirty="0" smtClean="0"/>
+              <a:t>SPIXEVT</a:t>
+            </a:r>
+            <a:endParaRPr lang="en-US" sz="3600" dirty="0"/>
           </a:p>
         </p:txBody>
       </p:sp>
@@ -10985,7 +10874,12 @@
             <p:ph idx="1"/>
           </p:nvPr>
         </p:nvSpPr>
-        <p:spPr/>
+        <p:spPr>
+          <a:xfrm>
+            <a:off x="333375" y="2057400"/>
+            <a:ext cx="8467725" cy="3937000"/>
+          </a:xfrm>
+        </p:spPr>
         <p:txBody>
           <a:bodyPr>
             <a:normAutofit/>
@@ -10993,18 +10887,21 @@
           <a:lstStyle/>
           <a:p>
             <a:r>
-              <a:rPr lang="en-US" sz="3600" dirty="0" smtClean="0"/>
-              <a:t>SPIXEVT    - Get an </a:t>
-            </a:r>
-            <a:r>
-              <a:rPr lang="en-US" sz="3600" dirty="0" err="1" smtClean="0"/>
-              <a:t>interrup</a:t>
-            </a:r>
-            <a:r>
-              <a:rPr lang="en-US" sz="3600" dirty="0" smtClean="0"/>
-              <a:t> </a:t>
-            </a:r>
-            <a:endParaRPr lang="en-US" sz="3600" dirty="0" smtClean="0"/>
+              <a:rPr lang="en-US" sz="2800" dirty="0"/>
+              <a:t>66AK2H12 has multiple instances of SPI; We will look at SPI 0</a:t>
+            </a:r>
+          </a:p>
+          <a:p>
+            <a:r>
+              <a:rPr lang="en-US" sz="2800" dirty="0" smtClean="0"/>
+              <a:t>SPIXEVT is NOT a primary event so it should be mapped via CIC</a:t>
+            </a:r>
+          </a:p>
+          <a:p>
+            <a:r>
+              <a:rPr lang="en-US" sz="2800" dirty="0" smtClean="0"/>
+              <a:t>The next slide shows the system events that are associated with SPIXEVT</a:t>
+            </a:r>
           </a:p>
         </p:txBody>
       </p:sp>
@@ -11033,11 +10930,6 @@
         </p:txBody>
       </p:sp>
     </p:spTree>
-    <p:extLst>
-      <p:ext uri="{BB962C8B-B14F-4D97-AF65-F5344CB8AC3E}">
-        <p14:creationId xmlns:p14="http://schemas.microsoft.com/office/powerpoint/2010/main" val="1187852695"/>
-      </p:ext>
-    </p:extLst>
   </p:cSld>
   <p:clrMapOvr>
     <a:masterClrMapping/>
@@ -11117,15 +11009,30 @@
           <a:lstStyle/>
           <a:p>
             <a:r>
+              <a:rPr lang="en-US" sz="2800" b="1" dirty="0" smtClean="0"/>
+              <a:t>Interrupt Scheme </a:t>
+            </a:r>
+            <a:endParaRPr lang="en-US" sz="2800" b="1" dirty="0"/>
+          </a:p>
+          <a:p>
+            <a:r>
               <a:rPr lang="en-US" sz="2800" dirty="0" smtClean="0"/>
-              <a:t>Interrupt Scheme (SPI 0 Example)</a:t>
+              <a:t>Example 1 – SPI transmit Interrupt</a:t>
             </a:r>
           </a:p>
           <a:p>
             <a:r>
               <a:rPr lang="en-US" sz="2800" dirty="0" smtClean="0"/>
-              <a:t>Configuring Interrupts (Hyperlink Example)</a:t>
-            </a:r>
+              <a:t>Example 2 – Hyperlink interrupt</a:t>
+            </a:r>
+            <a:endParaRPr lang="en-US" sz="2800" dirty="0" smtClean="0"/>
+          </a:p>
+          <a:p>
+            <a:r>
+              <a:rPr lang="en-US" sz="2800" dirty="0" smtClean="0"/>
+              <a:t>ARM interrupt scheme</a:t>
+            </a:r>
+            <a:endParaRPr lang="en-US" sz="2800" dirty="0" smtClean="0"/>
           </a:p>
         </p:txBody>
       </p:sp>
@@ -11162,129 +11069,6 @@
 </file>
 
 <file path=ppt/slides/slide20.xml><?xml version="1.0" encoding="utf-8"?>
-<p:sld xmlns:a="http://schemas.openxmlformats.org/drawingml/2006/main" xmlns:r="http://schemas.openxmlformats.org/officeDocument/2006/relationships" xmlns:p="http://schemas.openxmlformats.org/presentationml/2006/main">
-  <p:cSld>
-    <p:spTree>
-      <p:nvGrpSpPr>
-        <p:cNvPr id="1" name=""/>
-        <p:cNvGrpSpPr/>
-        <p:nvPr/>
-      </p:nvGrpSpPr>
-      <p:grpSpPr>
-        <a:xfrm>
-          <a:off x="0" y="0"/>
-          <a:ext cx="0" cy="0"/>
-          <a:chOff x="0" y="0"/>
-          <a:chExt cx="0" cy="0"/>
-        </a:xfrm>
-      </p:grpSpPr>
-      <p:sp>
-        <p:nvSpPr>
-          <p:cNvPr id="2" name="Title 1"/>
-          <p:cNvSpPr>
-            <a:spLocks noGrp="1"/>
-          </p:cNvSpPr>
-          <p:nvPr>
-            <p:ph type="title"/>
-          </p:nvPr>
-        </p:nvSpPr>
-        <p:spPr>
-          <a:xfrm>
-            <a:off x="457200" y="274638"/>
-            <a:ext cx="8229600" cy="715962"/>
-          </a:xfrm>
-        </p:spPr>
-        <p:txBody>
-          <a:bodyPr>
-            <a:normAutofit/>
-          </a:bodyPr>
-          <a:lstStyle/>
-          <a:p>
-            <a:r>
-              <a:rPr lang="en-US" sz="3600" dirty="0" smtClean="0"/>
-              <a:t>Example 1 – ISR connected to SPIXEVT</a:t>
-            </a:r>
-            <a:endParaRPr lang="en-US" sz="3600" dirty="0"/>
-          </a:p>
-        </p:txBody>
-      </p:sp>
-      <p:sp>
-        <p:nvSpPr>
-          <p:cNvPr id="3" name="Content Placeholder 2"/>
-          <p:cNvSpPr>
-            <a:spLocks noGrp="1"/>
-          </p:cNvSpPr>
-          <p:nvPr>
-            <p:ph idx="1"/>
-          </p:nvPr>
-        </p:nvSpPr>
-        <p:spPr/>
-        <p:txBody>
-          <a:bodyPr>
-            <a:normAutofit/>
-          </a:bodyPr>
-          <a:lstStyle/>
-          <a:p>
-            <a:r>
-              <a:rPr lang="en-US" sz="2800" dirty="0"/>
-              <a:t>66AK2H12 has multiple instances of SPI; We will look at SPI 0</a:t>
-            </a:r>
-          </a:p>
-          <a:p>
-            <a:r>
-              <a:rPr lang="en-US" sz="2800" dirty="0" smtClean="0"/>
-              <a:t>SPIXEVT is NOT a primary event so it should be mapped via CIC</a:t>
-            </a:r>
-          </a:p>
-          <a:p>
-            <a:r>
-              <a:rPr lang="en-US" sz="2800" dirty="0" smtClean="0"/>
-              <a:t>The next slide shows the system events that are associated with SPIXEVT</a:t>
-            </a:r>
-            <a:endParaRPr lang="en-US" sz="2800" dirty="0" smtClean="0"/>
-          </a:p>
-        </p:txBody>
-      </p:sp>
-      <p:sp>
-        <p:nvSpPr>
-          <p:cNvPr id="4" name="Slide Number Placeholder 3"/>
-          <p:cNvSpPr>
-            <a:spLocks noGrp="1"/>
-          </p:cNvSpPr>
-          <p:nvPr>
-            <p:ph type="sldNum" sz="quarter" idx="10"/>
-          </p:nvPr>
-        </p:nvSpPr>
-        <p:spPr/>
-        <p:txBody>
-          <a:bodyPr/>
-          <a:lstStyle/>
-          <a:p>
-            <a:fld id="{3B20521C-F793-4067-BB07-C7AF74E21EF3}" type="slidenum">
-              <a:rPr lang="en-US" smtClean="0"/>
-              <a:pPr/>
-              <a:t>20</a:t>
-            </a:fld>
-            <a:endParaRPr lang="en-US" dirty="0"/>
-          </a:p>
-        </p:txBody>
-      </p:sp>
-    </p:spTree>
-  </p:cSld>
-  <p:clrMapOvr>
-    <a:masterClrMapping/>
-  </p:clrMapOvr>
-  <p:timing>
-    <p:tnLst>
-      <p:par>
-        <p:cTn id="1" dur="indefinite" restart="never" nodeType="tmRoot"/>
-      </p:par>
-    </p:tnLst>
-  </p:timing>
-</p:sld>
-</file>
-
-<file path=ppt/slides/slide21.xml><?xml version="1.0" encoding="utf-8"?>
 <p:sld xmlns:a="http://schemas.openxmlformats.org/drawingml/2006/main" xmlns:r="http://schemas.openxmlformats.org/officeDocument/2006/relationships" xmlns:p="http://schemas.openxmlformats.org/presentationml/2006/main">
   <p:cSld>
     <p:spTree>
@@ -11399,7 +11183,7 @@
             <a:fld id="{803D9FE4-F784-4A94-8F3E-54A098F0E8CC}" type="slidenum">
               <a:rPr lang="en-US" smtClean="0"/>
               <a:pPr/>
-              <a:t>21</a:t>
+              <a:t>20</a:t>
             </a:fld>
             <a:endParaRPr lang="en-US" dirty="0"/>
           </a:p>
@@ -11439,6 +11223,147 @@
     <p:extLst>
       <p:ext uri="{BB962C8B-B14F-4D97-AF65-F5344CB8AC3E}">
         <p14:creationId xmlns:p14="http://schemas.microsoft.com/office/powerpoint/2010/main" val="140882993"/>
+      </p:ext>
+    </p:extLst>
+  </p:cSld>
+  <p:clrMapOvr>
+    <a:masterClrMapping/>
+  </p:clrMapOvr>
+  <p:timing>
+    <p:tnLst>
+      <p:par>
+        <p:cTn id="1" dur="indefinite" restart="never" nodeType="tmRoot"/>
+      </p:par>
+    </p:tnLst>
+  </p:timing>
+</p:sld>
+</file>
+
+<file path=ppt/slides/slide21.xml><?xml version="1.0" encoding="utf-8"?>
+<p:sld xmlns:a="http://schemas.openxmlformats.org/drawingml/2006/main" xmlns:r="http://schemas.openxmlformats.org/officeDocument/2006/relationships" xmlns:p="http://schemas.openxmlformats.org/presentationml/2006/main">
+  <p:cSld>
+    <p:spTree>
+      <p:nvGrpSpPr>
+        <p:cNvPr id="1" name=""/>
+        <p:cNvGrpSpPr/>
+        <p:nvPr/>
+      </p:nvGrpSpPr>
+      <p:grpSpPr>
+        <a:xfrm>
+          <a:off x="0" y="0"/>
+          <a:ext cx="0" cy="0"/>
+          <a:chOff x="0" y="0"/>
+          <a:chExt cx="0" cy="0"/>
+        </a:xfrm>
+      </p:grpSpPr>
+      <p:sp>
+        <p:nvSpPr>
+          <p:cNvPr id="2" name="Title 1"/>
+          <p:cNvSpPr>
+            <a:spLocks noGrp="1"/>
+          </p:cNvSpPr>
+          <p:nvPr>
+            <p:ph type="title"/>
+          </p:nvPr>
+        </p:nvSpPr>
+        <p:spPr>
+          <a:xfrm>
+            <a:off x="457200" y="274638"/>
+            <a:ext cx="8229600" cy="715962"/>
+          </a:xfrm>
+        </p:spPr>
+        <p:txBody>
+          <a:bodyPr>
+            <a:normAutofit/>
+          </a:bodyPr>
+          <a:lstStyle/>
+          <a:p>
+            <a:r>
+              <a:rPr lang="en-US" sz="3600" dirty="0" smtClean="0"/>
+              <a:t>ISR connected to SPIXEVT</a:t>
+            </a:r>
+            <a:endParaRPr lang="en-US" sz="3600" dirty="0"/>
+          </a:p>
+        </p:txBody>
+      </p:sp>
+      <p:sp>
+        <p:nvSpPr>
+          <p:cNvPr id="3" name="Content Placeholder 2"/>
+          <p:cNvSpPr>
+            <a:spLocks noGrp="1"/>
+          </p:cNvSpPr>
+          <p:nvPr>
+            <p:ph idx="1"/>
+          </p:nvPr>
+        </p:nvSpPr>
+        <p:spPr>
+          <a:xfrm>
+            <a:off x="333375" y="1048467"/>
+            <a:ext cx="8467725" cy="4752257"/>
+          </a:xfrm>
+        </p:spPr>
+        <p:txBody>
+          <a:bodyPr>
+            <a:normAutofit/>
+          </a:bodyPr>
+          <a:lstStyle/>
+          <a:p>
+            <a:r>
+              <a:rPr lang="en-US" sz="2800" dirty="0" smtClean="0"/>
+              <a:t>SPI_0_XEVT is input event number 56 to CIC </a:t>
+            </a:r>
+          </a:p>
+          <a:p>
+            <a:r>
+              <a:rPr lang="en-US" sz="2800" dirty="0" smtClean="0"/>
+              <a:t>What channel should be used?</a:t>
+            </a:r>
+          </a:p>
+          <a:p>
+            <a:r>
+              <a:rPr lang="en-US" sz="2800" dirty="0" smtClean="0"/>
+              <a:t>Table 5-22 shows the C66 core input event. There are multiple CIC output events that are connected to C66 core</a:t>
+            </a:r>
+          </a:p>
+          <a:p>
+            <a:r>
+              <a:rPr lang="en-US" sz="2800" dirty="0" smtClean="0"/>
+              <a:t>Some of these events are broadcast event (meaning – they are connected to all 4 cores that CIC supports) and some are individual core events.</a:t>
+            </a:r>
+          </a:p>
+          <a:p>
+            <a:endParaRPr lang="en-US" sz="2800" dirty="0" smtClean="0"/>
+          </a:p>
+        </p:txBody>
+      </p:sp>
+      <p:sp>
+        <p:nvSpPr>
+          <p:cNvPr id="4" name="Slide Number Placeholder 3"/>
+          <p:cNvSpPr>
+            <a:spLocks noGrp="1"/>
+          </p:cNvSpPr>
+          <p:nvPr>
+            <p:ph type="sldNum" sz="quarter" idx="10"/>
+          </p:nvPr>
+        </p:nvSpPr>
+        <p:spPr/>
+        <p:txBody>
+          <a:bodyPr/>
+          <a:lstStyle/>
+          <a:p>
+            <a:fld id="{3B20521C-F793-4067-BB07-C7AF74E21EF3}" type="slidenum">
+              <a:rPr lang="en-US" smtClean="0"/>
+              <a:pPr/>
+              <a:t>21</a:t>
+            </a:fld>
+            <a:endParaRPr lang="en-US" dirty="0"/>
+          </a:p>
+        </p:txBody>
+      </p:sp>
+    </p:spTree>
+    <p:extLst>
+      <p:ext uri="{BB962C8B-B14F-4D97-AF65-F5344CB8AC3E}">
+        <p14:creationId xmlns:p14="http://schemas.microsoft.com/office/powerpoint/2010/main" val="1368754799"/>
       </p:ext>
     </p:extLst>
   </p:cSld>
@@ -11514,42 +11439,38 @@
         </p:nvSpPr>
         <p:spPr>
           <a:xfrm>
-            <a:off x="333375" y="1048467"/>
-            <a:ext cx="8467725" cy="4752257"/>
+            <a:off x="5705475" y="1048468"/>
+            <a:ext cx="3095625" cy="4266482"/>
           </a:xfrm>
         </p:spPr>
         <p:txBody>
           <a:bodyPr>
-            <a:normAutofit/>
+            <a:normAutofit fontScale="85000" lnSpcReduction="20000"/>
           </a:bodyPr>
           <a:lstStyle/>
           <a:p>
+            <a:pPr marL="0" indent="0">
+              <a:buNone/>
+            </a:pPr>
+            <a:endParaRPr lang="en-US" sz="2800" dirty="0" smtClean="0"/>
+          </a:p>
+          <a:p>
+            <a:r>
+              <a:rPr lang="en-US" sz="2800" dirty="0"/>
+              <a:t>E</a:t>
+            </a:r>
             <a:r>
               <a:rPr lang="en-US" sz="2800" dirty="0" smtClean="0"/>
-              <a:t>SPI_0_XEVT is input event number 56 to CIC </a:t>
-            </a:r>
-          </a:p>
-          <a:p>
+              <a:t>ight events (56 to 63) come out of the interrupt controller</a:t>
+            </a:r>
+            <a:r>
+              <a:rPr lang="en-US" sz="2800" dirty="0"/>
+              <a:t> </a:t>
+            </a:r>
             <a:r>
               <a:rPr lang="en-US" sz="2800" dirty="0" smtClean="0"/>
-              <a:t>What channel should be used?</a:t>
-            </a:r>
-          </a:p>
-          <a:p>
-            <a:r>
-              <a:rPr lang="en-US" sz="2800" dirty="0" smtClean="0"/>
-              <a:t>Table 5-22 shows the C66 core input event. There are multiple CIC output events that are connected to C66 core</a:t>
-            </a:r>
-          </a:p>
-          <a:p>
-            <a:r>
-              <a:rPr lang="en-US" sz="2800" dirty="0" smtClean="0"/>
-              <a:t>Some of these events are broadcast event (meaning – they are connected to all 4 cores that CIC supports) and some are individual core events.</a:t>
-            </a:r>
-            <a:endParaRPr lang="en-US" sz="2800" dirty="0" smtClean="0"/>
-          </a:p>
-          <a:p>
-            <a:endParaRPr lang="en-US" sz="2800" dirty="0" smtClean="0"/>
+              <a:t>are broadcast events, they are connected to CIC output channel 0 to 7 respectively. This example uses C66 input event 63 that is connected to CIC_OUT7 </a:t>
+            </a:r>
           </a:p>
         </p:txBody>
       </p:sp>
@@ -11572,161 +11493,6 @@
               <a:rPr lang="en-US" smtClean="0"/>
               <a:pPr/>
               <a:t>22</a:t>
-            </a:fld>
-            <a:endParaRPr lang="en-US" dirty="0"/>
-          </a:p>
-        </p:txBody>
-      </p:sp>
-    </p:spTree>
-    <p:extLst>
-      <p:ext uri="{BB962C8B-B14F-4D97-AF65-F5344CB8AC3E}">
-        <p14:creationId xmlns:p14="http://schemas.microsoft.com/office/powerpoint/2010/main" val="1368754799"/>
-      </p:ext>
-    </p:extLst>
-  </p:cSld>
-  <p:clrMapOvr>
-    <a:masterClrMapping/>
-  </p:clrMapOvr>
-  <p:timing>
-    <p:tnLst>
-      <p:par>
-        <p:cTn id="1" dur="indefinite" restart="never" nodeType="tmRoot"/>
-      </p:par>
-    </p:tnLst>
-  </p:timing>
-</p:sld>
-</file>
-
-<file path=ppt/slides/slide23.xml><?xml version="1.0" encoding="utf-8"?>
-<p:sld xmlns:a="http://schemas.openxmlformats.org/drawingml/2006/main" xmlns:r="http://schemas.openxmlformats.org/officeDocument/2006/relationships" xmlns:p="http://schemas.openxmlformats.org/presentationml/2006/main">
-  <p:cSld>
-    <p:spTree>
-      <p:nvGrpSpPr>
-        <p:cNvPr id="1" name=""/>
-        <p:cNvGrpSpPr/>
-        <p:nvPr/>
-      </p:nvGrpSpPr>
-      <p:grpSpPr>
-        <a:xfrm>
-          <a:off x="0" y="0"/>
-          <a:ext cx="0" cy="0"/>
-          <a:chOff x="0" y="0"/>
-          <a:chExt cx="0" cy="0"/>
-        </a:xfrm>
-      </p:grpSpPr>
-      <p:sp>
-        <p:nvSpPr>
-          <p:cNvPr id="2" name="Title 1"/>
-          <p:cNvSpPr>
-            <a:spLocks noGrp="1"/>
-          </p:cNvSpPr>
-          <p:nvPr>
-            <p:ph type="title"/>
-          </p:nvPr>
-        </p:nvSpPr>
-        <p:spPr>
-          <a:xfrm>
-            <a:off x="457200" y="274638"/>
-            <a:ext cx="8229600" cy="715962"/>
-          </a:xfrm>
-        </p:spPr>
-        <p:txBody>
-          <a:bodyPr>
-            <a:normAutofit/>
-          </a:bodyPr>
-          <a:lstStyle/>
-          <a:p>
-            <a:r>
-              <a:rPr lang="en-US" sz="3600" dirty="0" smtClean="0"/>
-              <a:t>ISR connected to SPIXEVT</a:t>
-            </a:r>
-            <a:endParaRPr lang="en-US" sz="3600" dirty="0"/>
-          </a:p>
-        </p:txBody>
-      </p:sp>
-      <p:sp>
-        <p:nvSpPr>
-          <p:cNvPr id="3" name="Content Placeholder 2"/>
-          <p:cNvSpPr>
-            <a:spLocks noGrp="1"/>
-          </p:cNvSpPr>
-          <p:nvPr>
-            <p:ph idx="1"/>
-          </p:nvPr>
-        </p:nvSpPr>
-        <p:spPr>
-          <a:xfrm>
-            <a:off x="5705475" y="1048468"/>
-            <a:ext cx="3095625" cy="4266482"/>
-          </a:xfrm>
-        </p:spPr>
-        <p:txBody>
-          <a:bodyPr>
-            <a:normAutofit fontScale="85000" lnSpcReduction="20000"/>
-          </a:bodyPr>
-          <a:lstStyle/>
-          <a:p>
-            <a:pPr marL="0" indent="0">
-              <a:buNone/>
-            </a:pPr>
-            <a:endParaRPr lang="en-US" sz="2800" dirty="0" smtClean="0"/>
-          </a:p>
-          <a:p>
-            <a:r>
-              <a:rPr lang="en-US" sz="2800" dirty="0"/>
-              <a:t>E</a:t>
-            </a:r>
-            <a:r>
-              <a:rPr lang="en-US" sz="2800" dirty="0" smtClean="0"/>
-              <a:t>ight </a:t>
-            </a:r>
-            <a:r>
-              <a:rPr lang="en-US" sz="2800" dirty="0" smtClean="0"/>
-              <a:t>events (56 to 63</a:t>
-            </a:r>
-            <a:r>
-              <a:rPr lang="en-US" sz="2800" dirty="0" smtClean="0"/>
-              <a:t>) </a:t>
-            </a:r>
-            <a:r>
-              <a:rPr lang="en-US" sz="2800" dirty="0" smtClean="0"/>
-              <a:t>come out of the interrupt </a:t>
-            </a:r>
-            <a:r>
-              <a:rPr lang="en-US" sz="2800" dirty="0" smtClean="0"/>
-              <a:t>controller</a:t>
-            </a:r>
-            <a:r>
-              <a:rPr lang="en-US" sz="2800" dirty="0"/>
-              <a:t> </a:t>
-            </a:r>
-            <a:r>
-              <a:rPr lang="en-US" sz="2800" dirty="0" smtClean="0"/>
-              <a:t>are broadcast events, they are connected to CIC output channel 0 to 7 respectively. This example uses C66 input event 63 that is connected to CIC_OUT7 </a:t>
-            </a:r>
-            <a:endParaRPr lang="en-US" sz="2800" dirty="0" smtClean="0"/>
-          </a:p>
-        </p:txBody>
-      </p:sp>
-      <p:sp>
-        <p:nvSpPr>
-          <p:cNvPr id="4" name="Slide Number Placeholder 3"/>
-          <p:cNvSpPr>
-            <a:spLocks noGrp="1"/>
-          </p:cNvSpPr>
-          <p:nvPr>
-            <p:ph type="sldNum" sz="quarter" idx="10"/>
-          </p:nvPr>
-        </p:nvSpPr>
-        <p:spPr/>
-        <p:txBody>
-          <a:bodyPr/>
-          <a:lstStyle/>
-          <a:p>
-            <a:fld id="{3B20521C-F793-4067-BB07-C7AF74E21EF3}" type="slidenum">
-              <a:rPr lang="en-US" smtClean="0"/>
-              <a:pPr/>
-              <a:t>23</a:t>
             </a:fld>
             <a:endParaRPr lang="en-US" dirty="0"/>
           </a:p>
@@ -11784,7 +11550,7 @@
 </p:sld>
 </file>
 
-<file path=ppt/slides/slide24.xml><?xml version="1.0" encoding="utf-8"?>
+<file path=ppt/slides/slide23.xml><?xml version="1.0" encoding="utf-8"?>
 <p:sld xmlns:a="http://schemas.openxmlformats.org/drawingml/2006/main" xmlns:r="http://schemas.openxmlformats.org/officeDocument/2006/relationships" xmlns:p="http://schemas.openxmlformats.org/presentationml/2006/main">
   <p:cSld>
     <p:spTree>
@@ -11850,11 +11616,7 @@
           <a:p>
             <a:r>
               <a:rPr lang="en-US" sz="2800" dirty="0" smtClean="0"/>
-              <a:t>They </a:t>
-            </a:r>
-            <a:r>
-              <a:rPr lang="en-US" sz="2800" dirty="0" smtClean="0"/>
-              <a:t>are other events from the interrupt controller that could be considered (Both, broadcast and single core)</a:t>
+              <a:t>They are other events from the interrupt controller that could be considered (Both, broadcast and single core)</a:t>
             </a:r>
           </a:p>
           <a:p>
@@ -11883,7 +11645,7 @@
             <a:fld id="{3B20521C-F793-4067-BB07-C7AF74E21EF3}" type="slidenum">
               <a:rPr lang="en-US" smtClean="0"/>
               <a:pPr/>
-              <a:t>24</a:t>
+              <a:t>23</a:t>
             </a:fld>
             <a:endParaRPr lang="en-US" dirty="0"/>
           </a:p>
@@ -11909,7 +11671,7 @@
 </p:sld>
 </file>
 
-<file path=ppt/slides/slide25.xml><?xml version="1.0" encoding="utf-8"?>
+<file path=ppt/slides/slide24.xml><?xml version="1.0" encoding="utf-8"?>
 <p:sld xmlns:a="http://schemas.openxmlformats.org/drawingml/2006/main" xmlns:r="http://schemas.openxmlformats.org/officeDocument/2006/relationships" xmlns:p="http://schemas.openxmlformats.org/presentationml/2006/main">
   <p:cSld>
     <p:spTree>
@@ -11972,7 +11734,7 @@
           <a:graphicData uri="http://schemas.openxmlformats.org/presentationml/2006/ole">
             <mc:AlternateContent xmlns:mc="http://schemas.openxmlformats.org/markup-compatibility/2006">
               <mc:Choice xmlns:v="urn:schemas-microsoft-com:vml" Requires="v">
-                <p:oleObj spid="_x0000_s3091" name="Visio" r:id="rId3" imgW="8397082" imgH="6796932" progId="Visio.Drawing.11">
+                <p:oleObj spid="_x0000_s3094" name="Visio" r:id="rId3" imgW="8397082" imgH="6796932" progId="Visio.Drawing.11">
                   <p:embed/>
                 </p:oleObj>
               </mc:Choice>
@@ -12044,7 +11806,7 @@
             <a:fld id="{803D9FE4-F784-4A94-8F3E-54A098F0E8CC}" type="slidenum">
               <a:rPr lang="en-US" smtClean="0"/>
               <a:pPr/>
-              <a:t>25</a:t>
+              <a:t>24</a:t>
             </a:fld>
             <a:endParaRPr lang="en-US" dirty="0"/>
           </a:p>
@@ -12065,7 +11827,7 @@
 </p:sld>
 </file>
 
-<file path=ppt/slides/slide26.xml><?xml version="1.0" encoding="utf-8"?>
+<file path=ppt/slides/slide25.xml><?xml version="1.0" encoding="utf-8"?>
 <p:sld xmlns:a="http://schemas.openxmlformats.org/drawingml/2006/main" xmlns:r="http://schemas.openxmlformats.org/officeDocument/2006/relationships" xmlns:p="http://schemas.openxmlformats.org/presentationml/2006/main">
   <p:cSld>
     <p:spTree>
@@ -12142,7 +11904,7 @@
             <a:fld id="{3B20521C-F793-4067-BB07-C7AF74E21EF3}" type="slidenum">
               <a:rPr lang="en-US" smtClean="0"/>
               <a:pPr/>
-              <a:t>26</a:t>
+              <a:t>25</a:t>
             </a:fld>
             <a:endParaRPr lang="en-US" dirty="0"/>
           </a:p>
@@ -12270,29 +12032,13 @@
           <a:p>
             <a:r>
               <a:rPr lang="en-US" dirty="0" smtClean="0"/>
-              <a:t>Error = </a:t>
-            </a:r>
-            <a:r>
-              <a:rPr lang="en-US" dirty="0" err="1" smtClean="0"/>
-              <a:t>CSL_CPINTC_mapSystemToChannel</a:t>
-            </a:r>
+              <a:t>Error = CSL_CPINTC_mapSystemToChannel(hnd, 56,7) ;//CSL</a:t>
+            </a:r>
+          </a:p>
+          <a:p>
             <a:r>
               <a:rPr lang="en-US" dirty="0" smtClean="0"/>
-              <a:t>(hnd, 56,7) ;//CSL</a:t>
-            </a:r>
-          </a:p>
-          <a:p>
-            <a:r>
-              <a:rPr lang="en-US" dirty="0" smtClean="0"/>
-              <a:t>Error = </a:t>
-            </a:r>
-            <a:r>
-              <a:rPr lang="en-US" dirty="0" err="1" smtClean="0"/>
-              <a:t>CpIntc_mapSysIntToHostInt</a:t>
-            </a:r>
-            <a:r>
-              <a:rPr lang="en-US" dirty="0" smtClean="0"/>
-              <a:t>(0, </a:t>
+              <a:t>Error = CpIntc_mapSysIntToHostInt(0, </a:t>
             </a:r>
             <a:r>
               <a:rPr lang="en-US" dirty="0"/>
@@ -12325,6 +12071,135 @@
       </p:par>
     </p:tnLst>
   </p:timing>
+</p:sld>
+</file>
+
+<file path=ppt/slides/slide26.xml><?xml version="1.0" encoding="utf-8"?>
+<p:sld xmlns:a="http://schemas.openxmlformats.org/drawingml/2006/main" xmlns:r="http://schemas.openxmlformats.org/officeDocument/2006/relationships" xmlns:p="http://schemas.openxmlformats.org/presentationml/2006/main">
+  <p:cSld>
+    <p:spTree>
+      <p:nvGrpSpPr>
+        <p:cNvPr id="1" name=""/>
+        <p:cNvGrpSpPr/>
+        <p:nvPr/>
+      </p:nvGrpSpPr>
+      <p:grpSpPr>
+        <a:xfrm>
+          <a:off x="0" y="0"/>
+          <a:ext cx="0" cy="0"/>
+          <a:chOff x="0" y="0"/>
+          <a:chExt cx="0" cy="0"/>
+        </a:xfrm>
+      </p:grpSpPr>
+      <p:sp>
+        <p:nvSpPr>
+          <p:cNvPr id="2" name="Title 1"/>
+          <p:cNvSpPr>
+            <a:spLocks noGrp="1"/>
+          </p:cNvSpPr>
+          <p:nvPr>
+            <p:ph type="title"/>
+          </p:nvPr>
+        </p:nvSpPr>
+        <p:spPr>
+          <a:xfrm>
+            <a:off x="457200" y="274638"/>
+            <a:ext cx="8229600" cy="715962"/>
+          </a:xfrm>
+        </p:spPr>
+        <p:txBody>
+          <a:bodyPr>
+            <a:normAutofit/>
+          </a:bodyPr>
+          <a:lstStyle/>
+          <a:p>
+            <a:r>
+              <a:rPr lang="en-US" sz="3600" dirty="0" smtClean="0"/>
+              <a:t>Agenda</a:t>
+            </a:r>
+            <a:endParaRPr lang="en-US" sz="3600" dirty="0"/>
+          </a:p>
+        </p:txBody>
+      </p:sp>
+      <p:sp>
+        <p:nvSpPr>
+          <p:cNvPr id="3" name="Content Placeholder 2"/>
+          <p:cNvSpPr>
+            <a:spLocks noGrp="1"/>
+          </p:cNvSpPr>
+          <p:nvPr>
+            <p:ph idx="1"/>
+          </p:nvPr>
+        </p:nvSpPr>
+        <p:spPr/>
+        <p:txBody>
+          <a:bodyPr>
+            <a:normAutofit/>
+          </a:bodyPr>
+          <a:lstStyle/>
+          <a:p>
+            <a:r>
+              <a:rPr lang="en-US" sz="2800" dirty="0" smtClean="0"/>
+              <a:t>Interrupt Scheme </a:t>
+            </a:r>
+            <a:endParaRPr lang="en-US" sz="2800" dirty="0"/>
+          </a:p>
+          <a:p>
+            <a:r>
+              <a:rPr lang="en-US" sz="2800" dirty="0" smtClean="0"/>
+              <a:t>Example 1 – SPI transmit Interrupt</a:t>
+            </a:r>
+          </a:p>
+          <a:p>
+            <a:r>
+              <a:rPr lang="en-US" sz="2800" b="1" dirty="0" smtClean="0"/>
+              <a:t>Example 2 – Hyperlink interrupt</a:t>
+            </a:r>
+            <a:endParaRPr lang="en-US" sz="2800" b="1" dirty="0" smtClean="0"/>
+          </a:p>
+          <a:p>
+            <a:r>
+              <a:rPr lang="en-US" sz="2800" dirty="0" smtClean="0"/>
+              <a:t>ARM interrupt scheme</a:t>
+            </a:r>
+            <a:endParaRPr lang="en-US" sz="2800" dirty="0" smtClean="0"/>
+          </a:p>
+        </p:txBody>
+      </p:sp>
+      <p:sp>
+        <p:nvSpPr>
+          <p:cNvPr id="4" name="Slide Number Placeholder 3"/>
+          <p:cNvSpPr>
+            <a:spLocks noGrp="1"/>
+          </p:cNvSpPr>
+          <p:nvPr>
+            <p:ph type="sldNum" sz="quarter" idx="10"/>
+          </p:nvPr>
+        </p:nvSpPr>
+        <p:spPr/>
+        <p:txBody>
+          <a:bodyPr/>
+          <a:lstStyle/>
+          <a:p>
+            <a:fld id="{3B20521C-F793-4067-BB07-C7AF74E21EF3}" type="slidenum">
+              <a:rPr lang="en-US" smtClean="0"/>
+              <a:pPr/>
+              <a:t>26</a:t>
+            </a:fld>
+            <a:endParaRPr lang="en-US" dirty="0"/>
+          </a:p>
+        </p:txBody>
+      </p:sp>
+    </p:spTree>
+    <p:extLst>
+      <p:ext uri="{BB962C8B-B14F-4D97-AF65-F5344CB8AC3E}">
+        <p14:creationId xmlns:p14="http://schemas.microsoft.com/office/powerpoint/2010/main" val="1427989494"/>
+      </p:ext>
+    </p:extLst>
+  </p:cSld>
+  <p:clrMapOvr>
+    <a:masterClrMapping/>
+  </p:clrMapOvr>
 </p:sld>
 </file>
 
@@ -12357,8 +12232,8 @@
         </p:nvSpPr>
         <p:spPr>
           <a:xfrm>
-            <a:off x="457200" y="274638"/>
-            <a:ext cx="8229600" cy="715962"/>
+            <a:off x="457200" y="274637"/>
+            <a:ext cx="8229600" cy="1335087"/>
           </a:xfrm>
         </p:spPr>
         <p:txBody>
@@ -12369,7 +12244,18 @@
           <a:p>
             <a:r>
               <a:rPr lang="en-US" sz="3600" dirty="0" smtClean="0"/>
-              <a:t> Examples 2 Hyperlink</a:t>
+              <a:t> Examples 2 </a:t>
+            </a:r>
+            <a:r>
+              <a:rPr lang="en-US" sz="3600" dirty="0" smtClean="0"/>
+              <a:t/>
+            </a:r>
+            <a:br>
+              <a:rPr lang="en-US" sz="3600" dirty="0" smtClean="0"/>
+            </a:br>
+            <a:r>
+              <a:rPr lang="en-US" sz="3600" dirty="0" smtClean="0"/>
+              <a:t>Hyperlink Interrupt</a:t>
             </a:r>
             <a:endParaRPr lang="en-US" sz="3600" dirty="0"/>
           </a:p>
@@ -12385,7 +12271,12 @@
             <p:ph idx="1"/>
           </p:nvPr>
         </p:nvSpPr>
-        <p:spPr/>
+        <p:spPr>
+          <a:xfrm>
+            <a:off x="333375" y="2019300"/>
+            <a:ext cx="8467725" cy="3975100"/>
+          </a:xfrm>
+        </p:spPr>
         <p:txBody>
           <a:bodyPr>
             <a:normAutofit/>
@@ -12885,81 +12776,91 @@
       </p:grpSpPr>
       <p:sp>
         <p:nvSpPr>
-          <p:cNvPr id="10242" name="Rectangle 2"/>
-          <p:cNvSpPr>
-            <a:spLocks noGrp="1" noChangeArrowheads="1"/>
-          </p:cNvSpPr>
-          <p:nvPr>
-            <p:ph type="ctrTitle"/>
-          </p:nvPr>
-        </p:nvSpPr>
-        <p:spPr/>
-        <p:txBody>
-          <a:bodyPr/>
-          <a:lstStyle/>
-          <a:p>
-            <a:pPr algn="l" eaLnBrk="1" hangingPunct="1"/>
-            <a:r>
-              <a:rPr lang="en-US" dirty="0" smtClean="0">
-                <a:solidFill>
-                  <a:srgbClr val="DE0000"/>
-                </a:solidFill>
-              </a:rPr>
-              <a:t>Interrupt Scheme</a:t>
-            </a:r>
-            <a:endParaRPr lang="en-US" dirty="0" smtClean="0"/>
-          </a:p>
-        </p:txBody>
-      </p:sp>
-      <p:sp>
-        <p:nvSpPr>
-          <p:cNvPr id="10243" name="Rectangle 3"/>
-          <p:cNvSpPr>
-            <a:spLocks noGrp="1" noChangeArrowheads="1"/>
-          </p:cNvSpPr>
-          <p:nvPr>
-            <p:ph type="subTitle" idx="1"/>
-          </p:nvPr>
-        </p:nvSpPr>
-        <p:spPr/>
-        <p:txBody>
-          <a:bodyPr/>
-          <a:lstStyle/>
-          <a:p>
-            <a:pPr eaLnBrk="1" hangingPunct="1"/>
-            <a:r>
-              <a:rPr lang="en-US" dirty="0" smtClean="0"/>
-              <a:t>KeyStone Interrupts</a:t>
-            </a:r>
-          </a:p>
-        </p:txBody>
-      </p:sp>
-      <p:sp>
-        <p:nvSpPr>
-          <p:cNvPr id="10244" name="Slide Number Placeholder 3"/>
+          <p:cNvPr id="4" name="Title 3"/>
           <p:cNvSpPr>
             <a:spLocks noGrp="1"/>
           </p:cNvSpPr>
           <p:nvPr>
-            <p:ph type="sldNum" sz="quarter" idx="10"/>
+            <p:ph type="title"/>
           </p:nvPr>
         </p:nvSpPr>
         <p:spPr>
-          <a:noFill/>
+          <a:xfrm>
+            <a:off x="457200" y="274638"/>
+            <a:ext cx="8229600" cy="715962"/>
+          </a:xfrm>
         </p:spPr>
         <p:txBody>
-          <a:bodyPr/>
+          <a:bodyPr>
+            <a:normAutofit/>
+          </a:bodyPr>
           <a:lstStyle/>
           <a:p>
-            <a:fld id="{47D32EE0-5F6C-48D8-BBE6-18ABEB0052A3}" type="slidenum">
-              <a:rPr lang="en-US"/>
-              <a:pPr/>
-              <a:t>3</a:t>
-            </a:fld>
-            <a:endParaRPr lang="en-US" dirty="0"/>
-          </a:p>
-        </p:txBody>
-      </p:sp>
+            <a:r>
+              <a:rPr lang="en-US" sz="3600" dirty="0" smtClean="0"/>
+              <a:t>Link Events to ISR</a:t>
+            </a:r>
+            <a:endParaRPr lang="en-US" sz="3600" dirty="0"/>
+          </a:p>
+        </p:txBody>
+      </p:sp>
+      <p:graphicFrame>
+        <p:nvGraphicFramePr>
+          <p:cNvPr id="2" name="Object 1"/>
+          <p:cNvGraphicFramePr>
+            <a:graphicFrameLocks noChangeAspect="1"/>
+          </p:cNvGraphicFramePr>
+          <p:nvPr>
+            <p:extLst>
+              <p:ext uri="{D42A27DB-BD31-4B8C-83A1-F6EECF244321}">
+                <p14:modId xmlns:p14="http://schemas.microsoft.com/office/powerpoint/2010/main" val="1642275649"/>
+              </p:ext>
+            </p:extLst>
+          </p:nvPr>
+        </p:nvGraphicFramePr>
+        <p:xfrm>
+          <a:off x="705395" y="1296910"/>
+          <a:ext cx="6703559" cy="3997901"/>
+        </p:xfrm>
+        <a:graphic>
+          <a:graphicData uri="http://schemas.openxmlformats.org/presentationml/2006/ole">
+            <mc:AlternateContent xmlns:mc="http://schemas.openxmlformats.org/markup-compatibility/2006">
+              <mc:Choice xmlns:v="urn:schemas-microsoft-com:vml" Requires="v">
+                <p:oleObj spid="_x0000_s1048" name="Visio" r:id="rId3" imgW="8181318" imgH="5750031" progId="Visio.Drawing.11">
+                  <p:embed/>
+                </p:oleObj>
+              </mc:Choice>
+              <mc:Fallback>
+                <p:oleObj name="Visio" r:id="rId3" imgW="8181318" imgH="5750031" progId="Visio.Drawing.11">
+                  <p:embed/>
+                  <p:pic>
+                    <p:nvPicPr>
+                      <p:cNvPr id="0" name=""/>
+                      <p:cNvPicPr/>
+                      <p:nvPr/>
+                    </p:nvPicPr>
+                    <p:blipFill>
+                      <a:blip r:embed="rId4"/>
+                      <a:stretch>
+                        <a:fillRect/>
+                      </a:stretch>
+                    </p:blipFill>
+                    <p:spPr>
+                      <a:xfrm>
+                        <a:off x="705395" y="1296910"/>
+                        <a:ext cx="6703559" cy="3997901"/>
+                      </a:xfrm>
+                      <a:prstGeom prst="rect">
+                        <a:avLst/>
+                      </a:prstGeom>
+                    </p:spPr>
+                  </p:pic>
+                </p:oleObj>
+              </mc:Fallback>
+            </mc:AlternateContent>
+          </a:graphicData>
+        </a:graphic>
+      </p:graphicFrame>
     </p:spTree>
   </p:cSld>
   <p:clrMapOvr>
@@ -13311,6 +13212,135 @@
       </p:grpSpPr>
       <p:sp>
         <p:nvSpPr>
+          <p:cNvPr id="2" name="Title 1"/>
+          <p:cNvSpPr>
+            <a:spLocks noGrp="1"/>
+          </p:cNvSpPr>
+          <p:nvPr>
+            <p:ph type="title"/>
+          </p:nvPr>
+        </p:nvSpPr>
+        <p:spPr>
+          <a:xfrm>
+            <a:off x="457200" y="274638"/>
+            <a:ext cx="8229600" cy="715962"/>
+          </a:xfrm>
+        </p:spPr>
+        <p:txBody>
+          <a:bodyPr>
+            <a:normAutofit/>
+          </a:bodyPr>
+          <a:lstStyle/>
+          <a:p>
+            <a:r>
+              <a:rPr lang="en-US" sz="3600" dirty="0" smtClean="0"/>
+              <a:t>Agenda</a:t>
+            </a:r>
+            <a:endParaRPr lang="en-US" sz="3600" dirty="0"/>
+          </a:p>
+        </p:txBody>
+      </p:sp>
+      <p:sp>
+        <p:nvSpPr>
+          <p:cNvPr id="3" name="Content Placeholder 2"/>
+          <p:cNvSpPr>
+            <a:spLocks noGrp="1"/>
+          </p:cNvSpPr>
+          <p:nvPr>
+            <p:ph idx="1"/>
+          </p:nvPr>
+        </p:nvSpPr>
+        <p:spPr/>
+        <p:txBody>
+          <a:bodyPr>
+            <a:normAutofit/>
+          </a:bodyPr>
+          <a:lstStyle/>
+          <a:p>
+            <a:r>
+              <a:rPr lang="en-US" sz="2800" dirty="0" smtClean="0"/>
+              <a:t>Interrupt Scheme </a:t>
+            </a:r>
+            <a:endParaRPr lang="en-US" sz="2800" dirty="0"/>
+          </a:p>
+          <a:p>
+            <a:r>
+              <a:rPr lang="en-US" sz="2800" dirty="0" smtClean="0"/>
+              <a:t>Example 1 – SPI transmit Interrupt</a:t>
+            </a:r>
+          </a:p>
+          <a:p>
+            <a:r>
+              <a:rPr lang="en-US" sz="2800" dirty="0" smtClean="0"/>
+              <a:t>Example 2 – Hyperlink interrupt</a:t>
+            </a:r>
+            <a:endParaRPr lang="en-US" sz="2800" dirty="0" smtClean="0"/>
+          </a:p>
+          <a:p>
+            <a:r>
+              <a:rPr lang="en-US" sz="2800" b="1" dirty="0" smtClean="0"/>
+              <a:t>ARM interrupt scheme</a:t>
+            </a:r>
+            <a:endParaRPr lang="en-US" sz="2800" b="1" dirty="0" smtClean="0"/>
+          </a:p>
+        </p:txBody>
+      </p:sp>
+      <p:sp>
+        <p:nvSpPr>
+          <p:cNvPr id="4" name="Slide Number Placeholder 3"/>
+          <p:cNvSpPr>
+            <a:spLocks noGrp="1"/>
+          </p:cNvSpPr>
+          <p:nvPr>
+            <p:ph type="sldNum" sz="quarter" idx="10"/>
+          </p:nvPr>
+        </p:nvSpPr>
+        <p:spPr/>
+        <p:txBody>
+          <a:bodyPr/>
+          <a:lstStyle/>
+          <a:p>
+            <a:fld id="{3B20521C-F793-4067-BB07-C7AF74E21EF3}" type="slidenum">
+              <a:rPr lang="en-US" smtClean="0"/>
+              <a:pPr/>
+              <a:t>32</a:t>
+            </a:fld>
+            <a:endParaRPr lang="en-US" dirty="0"/>
+          </a:p>
+        </p:txBody>
+      </p:sp>
+    </p:spTree>
+    <p:extLst>
+      <p:ext uri="{BB962C8B-B14F-4D97-AF65-F5344CB8AC3E}">
+        <p14:creationId xmlns:p14="http://schemas.microsoft.com/office/powerpoint/2010/main" val="1427989494"/>
+      </p:ext>
+    </p:extLst>
+  </p:cSld>
+  <p:clrMapOvr>
+    <a:masterClrMapping/>
+  </p:clrMapOvr>
+</p:sld>
+</file>
+
+<file path=ppt/slides/slide33.xml><?xml version="1.0" encoding="utf-8"?>
+<p:sld xmlns:a="http://schemas.openxmlformats.org/drawingml/2006/main" xmlns:r="http://schemas.openxmlformats.org/officeDocument/2006/relationships" xmlns:p="http://schemas.openxmlformats.org/presentationml/2006/main">
+  <p:cSld>
+    <p:spTree>
+      <p:nvGrpSpPr>
+        <p:cNvPr id="1" name=""/>
+        <p:cNvGrpSpPr/>
+        <p:nvPr/>
+      </p:nvGrpSpPr>
+      <p:grpSpPr>
+        <a:xfrm>
+          <a:off x="0" y="0"/>
+          <a:ext cx="0" cy="0"/>
+          <a:chOff x="0" y="0"/>
+          <a:chExt cx="0" cy="0"/>
+        </a:xfrm>
+      </p:grpSpPr>
+      <p:sp>
+        <p:nvSpPr>
           <p:cNvPr id="3" name="Title 1"/>
           <p:cNvSpPr txBox="1">
             <a:spLocks/>
@@ -13319,8 +13349,8 @@
         </p:nvSpPr>
         <p:spPr>
           <a:xfrm>
-            <a:off x="449279" y="271604"/>
-            <a:ext cx="7391022" cy="1131684"/>
+            <a:off x="449279" y="590550"/>
+            <a:ext cx="7391022" cy="812738"/>
           </a:xfrm>
           <a:prstGeom prst="rect">
             <a:avLst/>
@@ -13401,7 +13431,7 @@
             <a:fld id="{4BD60626-1ACC-48B1-8201-AA7BD5684B54}" type="slidenum">
               <a:rPr lang="en-US" smtClean="0"/>
               <a:pPr/>
-              <a:t>32</a:t>
+              <a:t>33</a:t>
             </a:fld>
             <a:endParaRPr lang="en-US" dirty="0"/>
           </a:p>
@@ -13454,7 +13484,7 @@
 </p:sld>
 </file>
 
-<file path=ppt/slides/slide33.xml><?xml version="1.0" encoding="utf-8"?>
+<file path=ppt/slides/slide34.xml><?xml version="1.0" encoding="utf-8"?>
 <p:sld xmlns:a="http://schemas.openxmlformats.org/drawingml/2006/main" xmlns:r="http://schemas.openxmlformats.org/officeDocument/2006/relationships" xmlns:p="http://schemas.openxmlformats.org/presentationml/2006/main">
   <p:cSld>
     <p:spTree>
@@ -13489,7 +13519,7 @@
             <a:fld id="{3B20521C-F793-4067-BB07-C7AF74E21EF3}" type="slidenum">
               <a:rPr lang="en-US" smtClean="0"/>
               <a:pPr/>
-              <a:t>33</a:t>
+              <a:t>34</a:t>
             </a:fld>
             <a:endParaRPr lang="en-US" dirty="0"/>
           </a:p>
@@ -13616,7 +13646,7 @@
 </p:sld>
 </file>
 
-<file path=ppt/slides/slide34.xml><?xml version="1.0" encoding="utf-8"?>
+<file path=ppt/slides/slide35.xml><?xml version="1.0" encoding="utf-8"?>
 <p:sld xmlns:a="http://schemas.openxmlformats.org/drawingml/2006/main" xmlns:r="http://schemas.openxmlformats.org/officeDocument/2006/relationships" xmlns:p="http://schemas.openxmlformats.org/presentationml/2006/main">
   <p:cSld>
     <p:spTree>
@@ -13651,7 +13681,7 @@
             <a:fld id="{3B20521C-F793-4067-BB07-C7AF74E21EF3}" type="slidenum">
               <a:rPr lang="en-US" smtClean="0"/>
               <a:pPr/>
-              <a:t>34</a:t>
+              <a:t>35</a:t>
             </a:fld>
             <a:endParaRPr lang="en-US" dirty="0"/>
           </a:p>
@@ -13738,130 +13768,6 @@
 </p:sld>
 </file>
 
-<file path=ppt/slides/slide35.xml><?xml version="1.0" encoding="utf-8"?>
-<p:sld xmlns:a="http://schemas.openxmlformats.org/drawingml/2006/main" xmlns:r="http://schemas.openxmlformats.org/officeDocument/2006/relationships" xmlns:p="http://schemas.openxmlformats.org/presentationml/2006/main">
-  <p:cSld>
-    <p:spTree>
-      <p:nvGrpSpPr>
-        <p:cNvPr id="1" name=""/>
-        <p:cNvGrpSpPr/>
-        <p:nvPr/>
-      </p:nvGrpSpPr>
-      <p:grpSpPr>
-        <a:xfrm>
-          <a:off x="0" y="0"/>
-          <a:ext cx="0" cy="0"/>
-          <a:chOff x="0" y="0"/>
-          <a:chExt cx="0" cy="0"/>
-        </a:xfrm>
-      </p:grpSpPr>
-      <p:sp>
-        <p:nvSpPr>
-          <p:cNvPr id="2" name="Title 1"/>
-          <p:cNvSpPr>
-            <a:spLocks noGrp="1"/>
-          </p:cNvSpPr>
-          <p:nvPr>
-            <p:ph type="title"/>
-          </p:nvPr>
-        </p:nvSpPr>
-        <p:spPr/>
-        <p:txBody>
-          <a:bodyPr/>
-          <a:lstStyle/>
-          <a:p>
-            <a:r>
-              <a:rPr lang="en-US" dirty="0" smtClean="0"/>
-              <a:t>From the file gpio-keystone.c</a:t>
-            </a:r>
-            <a:endParaRPr lang="en-US" dirty="0"/>
-          </a:p>
-        </p:txBody>
-      </p:sp>
-      <p:sp>
-        <p:nvSpPr>
-          <p:cNvPr id="4" name="Slide Number Placeholder 3"/>
-          <p:cNvSpPr>
-            <a:spLocks noGrp="1"/>
-          </p:cNvSpPr>
-          <p:nvPr>
-            <p:ph type="sldNum" sz="quarter" idx="10"/>
-          </p:nvPr>
-        </p:nvSpPr>
-        <p:spPr/>
-        <p:txBody>
-          <a:bodyPr/>
-          <a:lstStyle/>
-          <a:p>
-            <a:fld id="{3B20521C-F793-4067-BB07-C7AF74E21EF3}" type="slidenum">
-              <a:rPr lang="en-US" smtClean="0"/>
-              <a:pPr/>
-              <a:t>35</a:t>
-            </a:fld>
-            <a:endParaRPr lang="en-US" dirty="0"/>
-          </a:p>
-        </p:txBody>
-      </p:sp>
-      <p:pic>
-        <p:nvPicPr>
-          <p:cNvPr id="38916" name="Picture 4"/>
-          <p:cNvPicPr>
-            <a:picLocks noGrp="1" noChangeAspect="1" noChangeArrowheads="1"/>
-          </p:cNvPicPr>
-          <p:nvPr>
-            <p:ph idx="1"/>
-          </p:nvPr>
-        </p:nvPicPr>
-        <p:blipFill>
-          <a:blip r:embed="rId2" cstate="print"/>
-          <a:srcRect/>
-          <a:stretch>
-            <a:fillRect/>
-          </a:stretch>
-        </p:blipFill>
-        <p:spPr bwMode="auto">
-          <a:xfrm>
-            <a:off x="1195387" y="1249362"/>
-            <a:ext cx="6743700" cy="4543425"/>
-          </a:xfrm>
-          <a:prstGeom prst="rect">
-            <a:avLst/>
-          </a:prstGeom>
-          <a:ln>
-            <a:headEnd/>
-            <a:tailEnd/>
-          </a:ln>
-        </p:spPr>
-        <p:style>
-          <a:lnRef idx="1">
-            <a:schemeClr val="accent2"/>
-          </a:lnRef>
-          <a:fillRef idx="2">
-            <a:schemeClr val="accent2"/>
-          </a:fillRef>
-          <a:effectRef idx="1">
-            <a:schemeClr val="accent2"/>
-          </a:effectRef>
-          <a:fontRef idx="minor">
-            <a:schemeClr val="dk1"/>
-          </a:fontRef>
-        </p:style>
-      </p:pic>
-    </p:spTree>
-  </p:cSld>
-  <p:clrMapOvr>
-    <a:masterClrMapping/>
-  </p:clrMapOvr>
-  <p:timing>
-    <p:tnLst>
-      <p:par>
-        <p:cTn id="1" dur="indefinite" restart="never" nodeType="tmRoot"/>
-      </p:par>
-    </p:tnLst>
-  </p:timing>
-</p:sld>
-</file>
-
 <file path=ppt/slides/slide36.xml><?xml version="1.0" encoding="utf-8"?>
 <p:sld xmlns:a="http://schemas.openxmlformats.org/drawingml/2006/main" xmlns:r="http://schemas.openxmlformats.org/officeDocument/2006/relationships" xmlns:p="http://schemas.openxmlformats.org/presentationml/2006/main">
   <p:cSld>
@@ -13889,14 +13795,34 @@
             <p:ph type="title"/>
           </p:nvPr>
         </p:nvSpPr>
-        <p:spPr/>
+        <p:spPr>
+          <a:xfrm>
+            <a:off x="231775" y="142874"/>
+            <a:ext cx="8458200" cy="1266825"/>
+          </a:xfrm>
+        </p:spPr>
         <p:txBody>
           <a:bodyPr/>
           <a:lstStyle/>
           <a:p>
             <a:r>
               <a:rPr lang="en-US" dirty="0" smtClean="0"/>
-              <a:t>From the file gpio-keystone.c</a:t>
+              <a:t>From the file </a:t>
+            </a:r>
+            <a:r>
+              <a:rPr lang="en-US" dirty="0"/>
+              <a:t>gpio-keystone.c</a:t>
+            </a:r>
+            <a:br>
+              <a:rPr lang="en-US" dirty="0"/>
+            </a:br>
+            <a:r>
+              <a:rPr lang="en-US" sz="3200" dirty="0" smtClean="0"/>
+              <a:t>(/git/linux-keystone/drivers/gpio</a:t>
+            </a:r>
+            <a:r>
+              <a:rPr lang="en-US" dirty="0" smtClean="0"/>
+              <a:t>)</a:t>
             </a:r>
             <a:endParaRPr lang="en-US" dirty="0"/>
           </a:p>
@@ -13926,70 +13852,104 @@
           </a:p>
         </p:txBody>
       </p:sp>
-      <p:pic>
-        <p:nvPicPr>
-          <p:cNvPr id="41986" name="Picture 2"/>
-          <p:cNvPicPr>
-            <a:picLocks noChangeAspect="1" noChangeArrowheads="1"/>
-          </p:cNvPicPr>
+      <p:sp>
+        <p:nvSpPr>
+          <p:cNvPr id="5" name="TextBox 4"/>
+          <p:cNvSpPr txBox="1"/>
           <p:nvPr/>
-        </p:nvPicPr>
-        <p:blipFill>
-          <a:blip r:embed="rId2" cstate="print"/>
-          <a:srcRect/>
-          <a:stretch>
-            <a:fillRect/>
-          </a:stretch>
-        </p:blipFill>
-        <p:spPr bwMode="auto">
+        </p:nvSpPr>
+        <p:spPr>
           <a:xfrm>
-            <a:off x="571370" y="769544"/>
-            <a:ext cx="7463064" cy="3162866"/>
+            <a:off x="790575" y="1524000"/>
+            <a:ext cx="7545655" cy="3970318"/>
           </a:xfrm>
           <a:prstGeom prst="rect">
             <a:avLst/>
           </a:prstGeom>
           <a:noFill/>
-          <a:ln w="9525">
-            <a:noFill/>
-            <a:miter lim="800000"/>
-            <a:headEnd/>
-            <a:tailEnd/>
-          </a:ln>
         </p:spPr>
-      </p:pic>
-      <p:pic>
-        <p:nvPicPr>
-          <p:cNvPr id="41987" name="Picture 3"/>
-          <p:cNvPicPr>
-            <a:picLocks noChangeAspect="1" noChangeArrowheads="1"/>
-          </p:cNvPicPr>
-          <p:nvPr/>
-        </p:nvPicPr>
-        <p:blipFill>
-          <a:blip r:embed="rId3" cstate="print"/>
-          <a:srcRect/>
-          <a:stretch>
-            <a:fillRect/>
-          </a:stretch>
-        </p:blipFill>
-        <p:spPr bwMode="auto">
-          <a:xfrm>
-            <a:off x="705982" y="4043363"/>
-            <a:ext cx="6591300" cy="2428875"/>
-          </a:xfrm>
-          <a:prstGeom prst="rect">
-            <a:avLst/>
-          </a:prstGeom>
-          <a:noFill/>
-          <a:ln w="9525">
-            <a:noFill/>
-            <a:miter lim="800000"/>
-            <a:headEnd/>
-            <a:tailEnd/>
-          </a:ln>
-        </p:spPr>
-      </p:pic>
+        <p:txBody>
+          <a:bodyPr wrap="none" rtlCol="0">
+            <a:spAutoFit/>
+          </a:bodyPr>
+          <a:lstStyle/>
+          <a:p>
+            <a:r>
+              <a:rPr lang="en-US" dirty="0"/>
+              <a:t>static int keystone_gpio_irq_map(struct irq_domain *h, unsigned int virq,</a:t>
+            </a:r>
+          </a:p>
+          <a:p>
+            <a:r>
+              <a:rPr lang="en-US" dirty="0"/>
+              <a:t>                                irq_hw_number_t hw)</a:t>
+            </a:r>
+          </a:p>
+          <a:p>
+            <a:r>
+              <a:rPr lang="en-US" dirty="0"/>
+              <a:t>{</a:t>
+            </a:r>
+          </a:p>
+          <a:p>
+            <a:r>
+              <a:rPr lang="en-US" dirty="0"/>
+              <a:t>        struct gpio_bank *bank = h-&gt;host_data;</a:t>
+            </a:r>
+          </a:p>
+          <a:p>
+            <a:endParaRPr lang="en-US" dirty="0"/>
+          </a:p>
+          <a:p>
+            <a:r>
+              <a:rPr lang="en-US" dirty="0"/>
+              <a:t>        irq_set_chip_data(virq, bank);</a:t>
+            </a:r>
+          </a:p>
+          <a:p>
+            <a:r>
+              <a:rPr lang="en-US" dirty="0"/>
+              <a:t>        irq_set_chip_and_handler(virq, &amp;keystone_gpio_irqchip,</a:t>
+            </a:r>
+          </a:p>
+          <a:p>
+            <a:r>
+              <a:rPr lang="en-US" dirty="0"/>
+              <a:t>                                handle_simple_irq);</a:t>
+            </a:r>
+          </a:p>
+          <a:p>
+            <a:r>
+              <a:rPr lang="en-US" dirty="0"/>
+              <a:t>        set_irq_flags(virq, IRQF_VALID | IRQF_PROBE);</a:t>
+            </a:r>
+          </a:p>
+          <a:p>
+            <a:r>
+              <a:rPr lang="en-US" dirty="0"/>
+              <a:t>        irq_set_irq_type(virq, IRQ_TYPE_NONE);</a:t>
+            </a:r>
+          </a:p>
+          <a:p>
+            <a:endParaRPr lang="en-US" dirty="0"/>
+          </a:p>
+          <a:p>
+            <a:r>
+              <a:rPr lang="en-US" dirty="0"/>
+              <a:t>        return 0;</a:t>
+            </a:r>
+          </a:p>
+          <a:p>
+            <a:r>
+              <a:rPr lang="en-US" dirty="0"/>
+              <a:t>}</a:t>
+            </a:r>
+          </a:p>
+          <a:p>
+            <a:endParaRPr lang="en-US" dirty="0"/>
+          </a:p>
+        </p:txBody>
+      </p:sp>
     </p:spTree>
   </p:cSld>
   <p:clrMapOvr>
@@ -14034,6 +13994,223 @@
         </p:nvSpPr>
         <p:spPr>
           <a:xfrm>
+            <a:off x="231775" y="142874"/>
+            <a:ext cx="8458200" cy="1038225"/>
+          </a:xfrm>
+        </p:spPr>
+        <p:txBody>
+          <a:bodyPr/>
+          <a:lstStyle/>
+          <a:p>
+            <a:r>
+              <a:rPr lang="en-US" dirty="0" smtClean="0"/>
+              <a:t>From the file </a:t>
+            </a:r>
+            <a:r>
+              <a:rPr lang="en-US" dirty="0"/>
+              <a:t>gpio-keystone.c</a:t>
+            </a:r>
+            <a:br>
+              <a:rPr lang="en-US" dirty="0"/>
+            </a:br>
+            <a:r>
+              <a:rPr lang="en-US" sz="3200" dirty="0"/>
+              <a:t>(/</a:t>
+            </a:r>
+            <a:r>
+              <a:rPr lang="en-US" sz="3200" dirty="0" smtClean="0"/>
+              <a:t>git/linux-keystone/drivers/gpio)</a:t>
+            </a:r>
+            <a:endParaRPr lang="en-US" sz="3200" dirty="0"/>
+          </a:p>
+        </p:txBody>
+      </p:sp>
+      <p:sp>
+        <p:nvSpPr>
+          <p:cNvPr id="4" name="Slide Number Placeholder 3"/>
+          <p:cNvSpPr>
+            <a:spLocks noGrp="1"/>
+          </p:cNvSpPr>
+          <p:nvPr>
+            <p:ph type="sldNum" sz="quarter" idx="10"/>
+          </p:nvPr>
+        </p:nvSpPr>
+        <p:spPr/>
+        <p:txBody>
+          <a:bodyPr/>
+          <a:lstStyle/>
+          <a:p>
+            <a:fld id="{3B20521C-F793-4067-BB07-C7AF74E21EF3}" type="slidenum">
+              <a:rPr lang="en-US" smtClean="0"/>
+              <a:pPr/>
+              <a:t>37</a:t>
+            </a:fld>
+            <a:endParaRPr lang="en-US" dirty="0"/>
+          </a:p>
+        </p:txBody>
+      </p:sp>
+      <p:sp>
+        <p:nvSpPr>
+          <p:cNvPr id="3" name="TextBox 2"/>
+          <p:cNvSpPr txBox="1"/>
+          <p:nvPr/>
+        </p:nvSpPr>
+        <p:spPr>
+          <a:xfrm>
+            <a:off x="866775" y="1257300"/>
+            <a:ext cx="7257115" cy="4801314"/>
+          </a:xfrm>
+          <a:prstGeom prst="rect">
+            <a:avLst/>
+          </a:prstGeom>
+          <a:noFill/>
+        </p:spPr>
+        <p:txBody>
+          <a:bodyPr wrap="none" rtlCol="0">
+            <a:spAutoFit/>
+          </a:bodyPr>
+          <a:lstStyle/>
+          <a:p>
+            <a:r>
+              <a:rPr lang="en-US" dirty="0"/>
+              <a:t>static void gpio_irq_enable(struct irq_data *d)</a:t>
+            </a:r>
+          </a:p>
+          <a:p>
+            <a:r>
+              <a:rPr lang="en-US" dirty="0"/>
+              <a:t>{</a:t>
+            </a:r>
+          </a:p>
+          <a:p>
+            <a:r>
+              <a:rPr lang="en-US" dirty="0"/>
+              <a:t>        struct gpio_bank *bank = irq_data_get_irq_chip_data(d);</a:t>
+            </a:r>
+          </a:p>
+          <a:p>
+            <a:r>
+              <a:rPr lang="en-US" dirty="0"/>
+              <a:t>        u32 mask, status = irqd_get_trigger_type(d);</a:t>
+            </a:r>
+          </a:p>
+          <a:p>
+            <a:r>
+              <a:rPr lang="en-US" dirty="0"/>
+              <a:t>        struct gpio_regs *regs = bank-&gt;regs;</a:t>
+            </a:r>
+          </a:p>
+          <a:p>
+            <a:r>
+              <a:rPr lang="en-US" dirty="0"/>
+              <a:t>        int gpio;</a:t>
+            </a:r>
+          </a:p>
+          <a:p>
+            <a:endParaRPr lang="en-US" dirty="0"/>
+          </a:p>
+          <a:p>
+            <a:r>
+              <a:rPr lang="en-US" dirty="0"/>
+              <a:t>        gpio = d-&gt;hwirq - bank-&gt;base;</a:t>
+            </a:r>
+          </a:p>
+          <a:p>
+            <a:r>
+              <a:rPr lang="en-US" dirty="0"/>
+              <a:t>        mask = 1 &lt;&lt; gpio;</a:t>
+            </a:r>
+          </a:p>
+          <a:p>
+            <a:endParaRPr lang="en-US" dirty="0"/>
+          </a:p>
+          <a:p>
+            <a:r>
+              <a:rPr lang="en-US" dirty="0"/>
+              <a:t>        if (status &amp; IRQ_TYPE_EDGE_FALLING)</a:t>
+            </a:r>
+          </a:p>
+          <a:p>
+            <a:r>
+              <a:rPr lang="en-US" dirty="0"/>
+              <a:t>                __raw_writel(mask, bank-&gt;reg_base + regs-&gt;set_fal_trig);</a:t>
+            </a:r>
+          </a:p>
+          <a:p>
+            <a:r>
+              <a:rPr lang="en-US" dirty="0"/>
+              <a:t>        if (status &amp; IRQ_TYPE_EDGE_RISING)</a:t>
+            </a:r>
+          </a:p>
+          <a:p>
+            <a:r>
+              <a:rPr lang="en-US" dirty="0"/>
+              <a:t>                __raw_writel(mask, bank-&gt;reg_base + regs-&gt;set_rise_trig);</a:t>
+            </a:r>
+          </a:p>
+          <a:p>
+            <a:r>
+              <a:rPr lang="en-US" dirty="0"/>
+              <a:t>}</a:t>
+            </a:r>
+          </a:p>
+          <a:p>
+            <a:endParaRPr lang="en-US" dirty="0"/>
+          </a:p>
+          <a:p>
+            <a:endParaRPr lang="en-US" dirty="0"/>
+          </a:p>
+        </p:txBody>
+      </p:sp>
+    </p:spTree>
+    <p:extLst>
+      <p:ext uri="{BB962C8B-B14F-4D97-AF65-F5344CB8AC3E}">
+        <p14:creationId xmlns:p14="http://schemas.microsoft.com/office/powerpoint/2010/main" val="3949338954"/>
+      </p:ext>
+    </p:extLst>
+  </p:cSld>
+  <p:clrMapOvr>
+    <a:masterClrMapping/>
+  </p:clrMapOvr>
+  <p:timing>
+    <p:tnLst>
+      <p:par>
+        <p:cTn id="1" dur="indefinite" restart="never" nodeType="tmRoot"/>
+      </p:par>
+    </p:tnLst>
+  </p:timing>
+</p:sld>
+</file>
+
+<file path=ppt/slides/slide38.xml><?xml version="1.0" encoding="utf-8"?>
+<p:sld xmlns:a="http://schemas.openxmlformats.org/drawingml/2006/main" xmlns:r="http://schemas.openxmlformats.org/officeDocument/2006/relationships" xmlns:p="http://schemas.openxmlformats.org/presentationml/2006/main">
+  <p:cSld>
+    <p:spTree>
+      <p:nvGrpSpPr>
+        <p:cNvPr id="1" name=""/>
+        <p:cNvGrpSpPr/>
+        <p:nvPr/>
+      </p:nvGrpSpPr>
+      <p:grpSpPr>
+        <a:xfrm>
+          <a:off x="0" y="0"/>
+          <a:ext cx="0" cy="0"/>
+          <a:chOff x="0" y="0"/>
+          <a:chExt cx="0" cy="0"/>
+        </a:xfrm>
+      </p:grpSpPr>
+      <p:sp>
+        <p:nvSpPr>
+          <p:cNvPr id="2" name="Title 1"/>
+          <p:cNvSpPr>
+            <a:spLocks noGrp="1"/>
+          </p:cNvSpPr>
+          <p:nvPr>
+            <p:ph type="title"/>
+          </p:nvPr>
+        </p:nvSpPr>
+        <p:spPr>
+          <a:xfrm>
             <a:off x="533400" y="1905000"/>
             <a:ext cx="8229600" cy="2362200"/>
           </a:xfrm>
@@ -14078,7 +14255,7 @@
             <a:fld id="{803D9FE4-F784-4A94-8F3E-54A098F0E8CC}" type="slidenum">
               <a:rPr lang="en-US" smtClean="0"/>
               <a:pPr/>
-              <a:t>37</a:t>
+              <a:t>38</a:t>
             </a:fld>
             <a:endParaRPr lang="en-US" dirty="0"/>
           </a:p>
@@ -14140,125 +14317,6 @@
           <a:p>
             <a:r>
               <a:rPr lang="en-US" sz="3600" dirty="0" smtClean="0"/>
-              <a:t>Link Events to ISR</a:t>
-            </a:r>
-            <a:endParaRPr lang="en-US" sz="3600" dirty="0"/>
-          </a:p>
-        </p:txBody>
-      </p:sp>
-      <p:graphicFrame>
-        <p:nvGraphicFramePr>
-          <p:cNvPr id="2" name="Object 1"/>
-          <p:cNvGraphicFramePr>
-            <a:graphicFrameLocks noChangeAspect="1"/>
-          </p:cNvGraphicFramePr>
-          <p:nvPr>
-            <p:extLst>
-              <p:ext uri="{D42A27DB-BD31-4B8C-83A1-F6EECF244321}">
-                <p14:modId xmlns:p14="http://schemas.microsoft.com/office/powerpoint/2010/main" val="1642275649"/>
-              </p:ext>
-            </p:extLst>
-          </p:nvPr>
-        </p:nvGraphicFramePr>
-        <p:xfrm>
-          <a:off x="705395" y="1296910"/>
-          <a:ext cx="6703559" cy="3997901"/>
-        </p:xfrm>
-        <a:graphic>
-          <a:graphicData uri="http://schemas.openxmlformats.org/presentationml/2006/ole">
-            <mc:AlternateContent xmlns:mc="http://schemas.openxmlformats.org/markup-compatibility/2006">
-              <mc:Choice xmlns:v="urn:schemas-microsoft-com:vml" Requires="v">
-                <p:oleObj spid="_x0000_s1045" name="Visio" r:id="rId3" imgW="8181318" imgH="5750031" progId="Visio.Drawing.11">
-                  <p:embed/>
-                </p:oleObj>
-              </mc:Choice>
-              <mc:Fallback>
-                <p:oleObj name="Visio" r:id="rId3" imgW="8181318" imgH="5750031" progId="Visio.Drawing.11">
-                  <p:embed/>
-                  <p:pic>
-                    <p:nvPicPr>
-                      <p:cNvPr id="0" name=""/>
-                      <p:cNvPicPr/>
-                      <p:nvPr/>
-                    </p:nvPicPr>
-                    <p:blipFill>
-                      <a:blip r:embed="rId4"/>
-                      <a:stretch>
-                        <a:fillRect/>
-                      </a:stretch>
-                    </p:blipFill>
-                    <p:spPr>
-                      <a:xfrm>
-                        <a:off x="705395" y="1296910"/>
-                        <a:ext cx="6703559" cy="3997901"/>
-                      </a:xfrm>
-                      <a:prstGeom prst="rect">
-                        <a:avLst/>
-                      </a:prstGeom>
-                    </p:spPr>
-                  </p:pic>
-                </p:oleObj>
-              </mc:Fallback>
-            </mc:AlternateContent>
-          </a:graphicData>
-        </a:graphic>
-      </p:graphicFrame>
-    </p:spTree>
-  </p:cSld>
-  <p:clrMapOvr>
-    <a:masterClrMapping/>
-  </p:clrMapOvr>
-  <p:timing>
-    <p:tnLst>
-      <p:par>
-        <p:cTn id="1" dur="indefinite" restart="never" nodeType="tmRoot"/>
-      </p:par>
-    </p:tnLst>
-  </p:timing>
-</p:sld>
-</file>
-
-<file path=ppt/slides/slide5.xml><?xml version="1.0" encoding="utf-8"?>
-<p:sld xmlns:a="http://schemas.openxmlformats.org/drawingml/2006/main" xmlns:r="http://schemas.openxmlformats.org/officeDocument/2006/relationships" xmlns:p="http://schemas.openxmlformats.org/presentationml/2006/main">
-  <p:cSld>
-    <p:spTree>
-      <p:nvGrpSpPr>
-        <p:cNvPr id="1" name=""/>
-        <p:cNvGrpSpPr/>
-        <p:nvPr/>
-      </p:nvGrpSpPr>
-      <p:grpSpPr>
-        <a:xfrm>
-          <a:off x="0" y="0"/>
-          <a:ext cx="0" cy="0"/>
-          <a:chOff x="0" y="0"/>
-          <a:chExt cx="0" cy="0"/>
-        </a:xfrm>
-      </p:grpSpPr>
-      <p:sp>
-        <p:nvSpPr>
-          <p:cNvPr id="4" name="Title 3"/>
-          <p:cNvSpPr>
-            <a:spLocks noGrp="1"/>
-          </p:cNvSpPr>
-          <p:nvPr>
-            <p:ph type="title"/>
-          </p:nvPr>
-        </p:nvSpPr>
-        <p:spPr>
-          <a:xfrm>
-            <a:off x="457200" y="274638"/>
-            <a:ext cx="8229600" cy="715962"/>
-          </a:xfrm>
-        </p:spPr>
-        <p:txBody>
-          <a:bodyPr>
-            <a:normAutofit/>
-          </a:bodyPr>
-          <a:lstStyle/>
-          <a:p>
-            <a:r>
-              <a:rPr lang="en-US" sz="3600" dirty="0" smtClean="0"/>
               <a:t>C66 core input events</a:t>
             </a:r>
             <a:endParaRPr lang="en-US" sz="3600" dirty="0"/>
@@ -14287,7 +14345,7 @@
           <a:graphicData uri="http://schemas.openxmlformats.org/presentationml/2006/ole">
             <mc:AlternateContent xmlns:mc="http://schemas.openxmlformats.org/markup-compatibility/2006">
               <mc:Choice xmlns:v="urn:schemas-microsoft-com:vml" Requires="v">
-                <p:oleObj spid="_x0000_s4111" name="Visio" r:id="rId3" imgW="6401070" imgH="4573925" progId="Visio.Drawing.11">
+                <p:oleObj spid="_x0000_s4114" name="Visio" r:id="rId3" imgW="6401070" imgH="4573925" progId="Visio.Drawing.11">
                   <p:embed/>
                 </p:oleObj>
               </mc:Choice>
@@ -14342,7 +14400,7 @@
 </p:sld>
 </file>
 
-<file path=ppt/slides/slide6.xml><?xml version="1.0" encoding="utf-8"?>
+<file path=ppt/slides/slide5.xml><?xml version="1.0" encoding="utf-8"?>
 <p:sld xmlns:a="http://schemas.openxmlformats.org/drawingml/2006/main" xmlns:r="http://schemas.openxmlformats.org/officeDocument/2006/relationships" xmlns:p="http://schemas.openxmlformats.org/presentationml/2006/main">
   <p:cSld>
     <p:spTree>
@@ -14411,7 +14469,7 @@
           <a:graphicData uri="http://schemas.openxmlformats.org/presentationml/2006/ole">
             <mc:AlternateContent xmlns:mc="http://schemas.openxmlformats.org/markup-compatibility/2006">
               <mc:Choice xmlns:v="urn:schemas-microsoft-com:vml" Requires="v">
-                <p:oleObj spid="_x0000_s5135" name="Visio" r:id="rId3" imgW="6401070" imgH="4764674" progId="Visio.Drawing.11">
+                <p:oleObj spid="_x0000_s5138" name="Visio" r:id="rId3" imgW="6401070" imgH="4764674" progId="Visio.Drawing.11">
                   <p:embed/>
                 </p:oleObj>
               </mc:Choice>
@@ -14682,7 +14740,7 @@
 </p:sld>
 </file>
 
-<file path=ppt/slides/slide7.xml><?xml version="1.0" encoding="utf-8"?>
+<file path=ppt/slides/slide6.xml><?xml version="1.0" encoding="utf-8"?>
 <p:sld xmlns:a="http://schemas.openxmlformats.org/drawingml/2006/main" xmlns:r="http://schemas.openxmlformats.org/officeDocument/2006/relationships" xmlns:p="http://schemas.openxmlformats.org/presentationml/2006/main">
   <p:cSld>
     <p:spTree>
@@ -14724,11 +14782,7 @@
             <a:pPr eaLnBrk="1" hangingPunct="1"/>
             <a:r>
               <a:rPr lang="en-US" dirty="0" smtClean="0"/>
-              <a:t>Configuring an </a:t>
-            </a:r>
-            <a:r>
-              <a:rPr lang="en-US" dirty="0" smtClean="0"/>
-              <a:t>Hwi Using BIOS</a:t>
+              <a:t>Configuring an Hwi Using BIOS</a:t>
             </a:r>
             <a:r>
               <a:rPr lang="en-US" dirty="0"/>
@@ -14739,11 +14793,7 @@
             </a:br>
             <a:r>
               <a:rPr lang="en-US" dirty="0" smtClean="0"/>
-              <a:t>Statically </a:t>
-            </a:r>
-            <a:r>
-              <a:rPr lang="en-US" dirty="0" smtClean="0"/>
-              <a:t>via GUI</a:t>
+              <a:t>Statically via GUI</a:t>
             </a:r>
           </a:p>
         </p:txBody>
@@ -15039,17 +15089,7 @@
                   <a:latin typeface="Calibri" pitchFamily="34" charset="0"/>
                   <a:cs typeface="Calibri" pitchFamily="34" charset="0"/>
                 </a:rPr>
-                <a:t>event 94</a:t>
-              </a:r>
-              <a:r>
-                <a:rPr lang="en-US" sz="2000" dirty="0" smtClean="0">
-                  <a:solidFill>
-                    <a:srgbClr val="000000"/>
-                  </a:solidFill>
-                  <a:latin typeface="Calibri" pitchFamily="34" charset="0"/>
-                  <a:cs typeface="Calibri" pitchFamily="34" charset="0"/>
-                </a:rPr>
-                <a:t> </a:t>
+                <a:t>event 94 </a:t>
               </a:r>
               <a:r>
                 <a:rPr lang="en-US" sz="2000" dirty="0">
@@ -15398,7 +15438,7 @@
                 </a:solidFill>
               </a:rPr>
               <a:pPr/>
-              <a:t>7</a:t>
+              <a:t>6</a:t>
             </a:fld>
             <a:endParaRPr lang="en-US" dirty="0">
               <a:solidFill>
@@ -15490,7 +15530,7 @@
 </p:sld>
 </file>
 
-<file path=ppt/slides/slide8.xml><?xml version="1.0" encoding="utf-8"?>
+<file path=ppt/slides/slide7.xml><?xml version="1.0" encoding="utf-8"?>
 <p:sld xmlns:a="http://schemas.openxmlformats.org/drawingml/2006/main" xmlns:r="http://schemas.openxmlformats.org/officeDocument/2006/relationships" xmlns:p="http://schemas.openxmlformats.org/presentationml/2006/main">
   <p:cSld>
     <p:spTree>
@@ -15562,7 +15602,7 @@
             <a:fld id="{803D9FE4-F784-4A94-8F3E-54A098F0E8CC}" type="slidenum">
               <a:rPr lang="en-US" smtClean="0"/>
               <a:pPr/>
-              <a:t>8</a:t>
+              <a:t>7</a:t>
             </a:fld>
             <a:endParaRPr lang="en-US" dirty="0"/>
           </a:p>
@@ -15652,7 +15692,7 @@
 </p:sld>
 </file>
 
-<file path=ppt/slides/slide9.xml><?xml version="1.0" encoding="utf-8"?>
+<file path=ppt/slides/slide8.xml><?xml version="1.0" encoding="utf-8"?>
 <p:sld xmlns:a="http://schemas.openxmlformats.org/drawingml/2006/main" xmlns:r="http://schemas.openxmlformats.org/officeDocument/2006/relationships" xmlns:p="http://schemas.openxmlformats.org/presentationml/2006/main">
   <p:cSld>
     <p:spTree>
@@ -15717,7 +15757,7 @@
             <a:fld id="{803D9FE4-F784-4A94-8F3E-54A098F0E8CC}" type="slidenum">
               <a:rPr lang="en-US" smtClean="0"/>
               <a:pPr/>
-              <a:t>9</a:t>
+              <a:t>8</a:t>
             </a:fld>
             <a:endParaRPr lang="en-US" dirty="0"/>
           </a:p>
@@ -15886,6 +15926,265 @@
     <p:extLst>
       <p:ext uri="{BB962C8B-B14F-4D97-AF65-F5344CB8AC3E}">
         <p14:creationId xmlns:p14="http://schemas.microsoft.com/office/powerpoint/2010/main" val="2267725419"/>
+      </p:ext>
+    </p:extLst>
+  </p:cSld>
+  <p:clrMapOvr>
+    <a:masterClrMapping/>
+  </p:clrMapOvr>
+  <p:timing>
+    <p:tnLst>
+      <p:par>
+        <p:cTn id="1" dur="indefinite" restart="never" nodeType="tmRoot"/>
+      </p:par>
+    </p:tnLst>
+  </p:timing>
+</p:sld>
+</file>
+
+<file path=ppt/slides/slide9.xml><?xml version="1.0" encoding="utf-8"?>
+<p:sld xmlns:a="http://schemas.openxmlformats.org/drawingml/2006/main" xmlns:r="http://schemas.openxmlformats.org/officeDocument/2006/relationships" xmlns:p="http://schemas.openxmlformats.org/presentationml/2006/main">
+  <p:cSld>
+    <p:spTree>
+      <p:nvGrpSpPr>
+        <p:cNvPr id="1" name=""/>
+        <p:cNvGrpSpPr/>
+        <p:nvPr/>
+      </p:nvGrpSpPr>
+      <p:grpSpPr>
+        <a:xfrm>
+          <a:off x="0" y="0"/>
+          <a:ext cx="0" cy="0"/>
+          <a:chOff x="0" y="0"/>
+          <a:chExt cx="0" cy="0"/>
+        </a:xfrm>
+      </p:grpSpPr>
+      <p:sp>
+        <p:nvSpPr>
+          <p:cNvPr id="5" name="TextBox 4"/>
+          <p:cNvSpPr txBox="1"/>
+          <p:nvPr/>
+        </p:nvSpPr>
+        <p:spPr>
+          <a:xfrm>
+            <a:off x="0" y="6243642"/>
+            <a:ext cx="8886825" cy="550068"/>
+          </a:xfrm>
+          <a:prstGeom prst="rect">
+            <a:avLst/>
+          </a:prstGeom>
+          <a:solidFill>
+            <a:schemeClr val="bg1"/>
+          </a:solidFill>
+        </p:spPr>
+        <p:txBody>
+          <a:bodyPr wrap="square" rtlCol="0">
+            <a:noAutofit/>
+          </a:bodyPr>
+          <a:lstStyle/>
+          <a:p>
+            <a:endParaRPr lang="en-US" dirty="0"/>
+          </a:p>
+        </p:txBody>
+      </p:sp>
+      <p:sp>
+        <p:nvSpPr>
+          <p:cNvPr id="4" name="Title 3"/>
+          <p:cNvSpPr>
+            <a:spLocks noGrp="1"/>
+          </p:cNvSpPr>
+          <p:nvPr>
+            <p:ph type="title"/>
+          </p:nvPr>
+        </p:nvSpPr>
+        <p:spPr>
+          <a:xfrm>
+            <a:off x="428625" y="153194"/>
+            <a:ext cx="8229600" cy="704055"/>
+          </a:xfrm>
+        </p:spPr>
+        <p:txBody>
+          <a:bodyPr>
+            <a:normAutofit fontScale="90000"/>
+          </a:bodyPr>
+          <a:lstStyle/>
+          <a:p>
+            <a:r>
+              <a:rPr lang="en-US" sz="3200" dirty="0" smtClean="0"/>
+              <a:t>C66 Core Prime </a:t>
+            </a:r>
+            <a:r>
+              <a:rPr lang="en-US" sz="3200" dirty="0"/>
+              <a:t>Event </a:t>
+            </a:r>
+            <a:r>
+              <a:rPr lang="en-US" sz="3200" dirty="0" smtClean="0"/>
+              <a:t>IDs</a:t>
+            </a:r>
+            <a:br>
+              <a:rPr lang="en-US" sz="3200" dirty="0" smtClean="0"/>
+            </a:br>
+            <a:r>
+              <a:rPr lang="en-US" sz="3200" dirty="0" smtClean="0"/>
+              <a:t>(Core Events Only)</a:t>
+            </a:r>
+            <a:endParaRPr lang="en-US" sz="3600" dirty="0"/>
+          </a:p>
+        </p:txBody>
+      </p:sp>
+      <p:pic>
+        <p:nvPicPr>
+          <p:cNvPr id="3075" name="Picture 3"/>
+          <p:cNvPicPr>
+            <a:picLocks noChangeAspect="1" noChangeArrowheads="1"/>
+          </p:cNvPicPr>
+          <p:nvPr/>
+        </p:nvPicPr>
+        <p:blipFill>
+          <a:blip r:embed="rId2" cstate="print"/>
+          <a:srcRect l="3504" r="18686"/>
+          <a:stretch>
+            <a:fillRect/>
+          </a:stretch>
+        </p:blipFill>
+        <p:spPr bwMode="auto">
+          <a:xfrm>
+            <a:off x="400049" y="952895"/>
+            <a:ext cx="4578073" cy="5847953"/>
+          </a:xfrm>
+          <a:prstGeom prst="rect">
+            <a:avLst/>
+          </a:prstGeom>
+          <a:noFill/>
+          <a:ln w="9525">
+            <a:noFill/>
+            <a:miter lim="800000"/>
+            <a:headEnd/>
+            <a:tailEnd/>
+          </a:ln>
+        </p:spPr>
+      </p:pic>
+      <p:sp>
+        <p:nvSpPr>
+          <p:cNvPr id="6" name="TextBox 5"/>
+          <p:cNvSpPr txBox="1"/>
+          <p:nvPr/>
+        </p:nvSpPr>
+        <p:spPr>
+          <a:xfrm>
+            <a:off x="5150644" y="1143000"/>
+            <a:ext cx="3764756" cy="2585323"/>
+          </a:xfrm>
+          <a:prstGeom prst="rect">
+            <a:avLst/>
+          </a:prstGeom>
+          <a:noFill/>
+        </p:spPr>
+        <p:txBody>
+          <a:bodyPr wrap="square" rtlCol="0">
+            <a:spAutoFit/>
+          </a:bodyPr>
+          <a:lstStyle/>
+          <a:p>
+            <a:r>
+              <a:rPr lang="en-US" dirty="0" smtClean="0"/>
+              <a:t>From the C66x User’s Guide:</a:t>
+            </a:r>
+          </a:p>
+          <a:p>
+            <a:pPr marL="342900" indent="-342900">
+              <a:buFont typeface="Arial" pitchFamily="34" charset="0"/>
+              <a:buChar char="•"/>
+            </a:pPr>
+            <a:r>
+              <a:rPr lang="en-US" dirty="0" smtClean="0"/>
+              <a:t>22 assigned events</a:t>
+            </a:r>
+          </a:p>
+          <a:p>
+            <a:pPr marL="800100" lvl="1" indent="-342900">
+              <a:buFont typeface="Arial" pitchFamily="34" charset="0"/>
+              <a:buChar char="•"/>
+            </a:pPr>
+            <a:r>
+              <a:rPr lang="en-US" dirty="0" smtClean="0"/>
+              <a:t>5 reserve primary events</a:t>
+            </a:r>
+          </a:p>
+          <a:p>
+            <a:pPr marL="800100" lvl="1" indent="-342900">
+              <a:buFont typeface="Arial" pitchFamily="34" charset="0"/>
+              <a:buChar char="•"/>
+            </a:pPr>
+            <a:r>
+              <a:rPr lang="en-US" dirty="0" smtClean="0"/>
+              <a:t>17 secondary events</a:t>
+            </a:r>
+          </a:p>
+          <a:p>
+            <a:pPr marL="342900" indent="-342900">
+              <a:buFont typeface="Arial" pitchFamily="34" charset="0"/>
+              <a:buChar char="•"/>
+            </a:pPr>
+            <a:r>
+              <a:rPr lang="en-US" dirty="0" smtClean="0"/>
+              <a:t>7 reserved events</a:t>
+            </a:r>
+          </a:p>
+          <a:p>
+            <a:pPr marL="342900" indent="-342900">
+              <a:buFont typeface="Arial" pitchFamily="34" charset="0"/>
+              <a:buChar char="•"/>
+            </a:pPr>
+            <a:r>
+              <a:rPr lang="en-US" dirty="0" smtClean="0"/>
+              <a:t>99 Available events</a:t>
+            </a:r>
+          </a:p>
+          <a:p>
+            <a:pPr marL="342900" indent="-342900">
+              <a:buFont typeface="Arial" pitchFamily="34" charset="0"/>
+              <a:buChar char="•"/>
+            </a:pPr>
+            <a:r>
+              <a:rPr lang="en-US" dirty="0" smtClean="0"/>
+              <a:t>The available events are connected to the device.</a:t>
+            </a:r>
+            <a:br>
+              <a:rPr lang="en-US" dirty="0" smtClean="0"/>
+            </a:br>
+            <a:endParaRPr lang="en-US" dirty="0" smtClean="0"/>
+          </a:p>
+        </p:txBody>
+      </p:sp>
+      <p:sp>
+        <p:nvSpPr>
+          <p:cNvPr id="7" name="Slide Number Placeholder 6"/>
+          <p:cNvSpPr>
+            <a:spLocks noGrp="1"/>
+          </p:cNvSpPr>
+          <p:nvPr>
+            <p:ph type="sldNum" sz="quarter" idx="10"/>
+          </p:nvPr>
+        </p:nvSpPr>
+        <p:spPr/>
+        <p:txBody>
+          <a:bodyPr/>
+          <a:lstStyle/>
+          <a:p>
+            <a:fld id="{803D9FE4-F784-4A94-8F3E-54A098F0E8CC}" type="slidenum">
+              <a:rPr lang="en-US" smtClean="0"/>
+              <a:pPr/>
+              <a:t>9</a:t>
+            </a:fld>
+            <a:endParaRPr lang="en-US" dirty="0"/>
+          </a:p>
+        </p:txBody>
+      </p:sp>
+    </p:spTree>
+    <p:extLst>
+      <p:ext uri="{BB962C8B-B14F-4D97-AF65-F5344CB8AC3E}">
+        <p14:creationId xmlns:p14="http://schemas.microsoft.com/office/powerpoint/2010/main" val="1238034943"/>
       </p:ext>
     </p:extLst>
   </p:cSld>

</xml_diff>

<commit_message>
small changes after looking at the slides
</commit_message>
<xml_diff>
--- a/slides/KeyStone_Interrupts.pptx
+++ b/slides/KeyStone_Interrupts.pptx
@@ -5287,11 +5287,7 @@
             </a:pPr>
             <a:r>
               <a:rPr lang="en-US" dirty="0" smtClean="0"/>
-              <a:t>Enable the particular </a:t>
-            </a:r>
-            <a:r>
-              <a:rPr lang="en-US" dirty="0" smtClean="0"/>
-              <a:t>interrupt</a:t>
+              <a:t>Enable the particular interrupt</a:t>
             </a:r>
           </a:p>
           <a:p>
@@ -5307,11 +5303,6 @@
               </a:rPr>
               <a:t>This presentation will not get into details of enabling the interrupts</a:t>
             </a:r>
-            <a:endParaRPr lang="en-US" dirty="0" smtClean="0">
-              <a:solidFill>
-                <a:schemeClr val="tx2"/>
-              </a:solidFill>
-            </a:endParaRPr>
           </a:p>
           <a:p>
             <a:pPr marL="742950" lvl="1" indent="-285750">
@@ -8476,7 +8467,7 @@
           <p:nvPr>
             <p:extLst>
               <p:ext uri="{D42A27DB-BD31-4B8C-83A1-F6EECF244321}">
-                <p14:modId xmlns:p14="http://schemas.microsoft.com/office/powerpoint/2010/main" val="2052470423"/>
+                <p14:modId xmlns:p14="http://schemas.microsoft.com/office/powerpoint/2010/main" val="692874209"/>
               </p:ext>
             </p:extLst>
           </p:nvPr>
@@ -8489,7 +8480,7 @@
           <a:graphicData uri="http://schemas.openxmlformats.org/presentationml/2006/ole">
             <mc:AlternateContent xmlns:mc="http://schemas.openxmlformats.org/markup-compatibility/2006">
               <mc:Choice xmlns:v="urn:schemas-microsoft-com:vml" Requires="v">
-                <p:oleObj spid="_x0000_s10253" name="Visio" r:id="rId3" imgW="9044738" imgH="6169084" progId="Visio.Drawing.11">
+                <p:oleObj spid="_x0000_s10255" name="Visio" r:id="rId3" imgW="9044738" imgH="6169084" progId="Visio.Drawing.11">
                   <p:embed/>
                 </p:oleObj>
               </mc:Choice>
@@ -8752,7 +8743,7 @@
           <a:graphicData uri="http://schemas.openxmlformats.org/presentationml/2006/ole">
             <mc:AlternateContent xmlns:mc="http://schemas.openxmlformats.org/markup-compatibility/2006">
               <mc:Choice xmlns:v="urn:schemas-microsoft-com:vml" Requires="v">
-                <p:oleObj spid="_x0000_s11276" name="Visio" r:id="rId4" imgW="9044738" imgH="6169084" progId="Visio.Drawing.11">
+                <p:oleObj spid="_x0000_s11278" name="Visio" r:id="rId4" imgW="9044738" imgH="6169084" progId="Visio.Drawing.11">
                   <p:embed/>
                 </p:oleObj>
               </mc:Choice>
@@ -10234,7 +10225,7 @@
           <a:graphicData uri="http://schemas.openxmlformats.org/presentationml/2006/ole">
             <mc:AlternateContent xmlns:mc="http://schemas.openxmlformats.org/markup-compatibility/2006">
               <mc:Choice xmlns:v="urn:schemas-microsoft-com:vml" Requires="v">
-                <p:oleObj spid="_x0000_s12297" name="Visio" r:id="rId3" imgW="9044738" imgH="6169084" progId="Visio.Drawing.11">
+                <p:oleObj spid="_x0000_s12299" name="Visio" r:id="rId3" imgW="9044738" imgH="6169084" progId="Visio.Drawing.11">
                   <p:embed/>
                 </p:oleObj>
               </mc:Choice>
@@ -10754,14 +10745,12 @@
               <a:rPr lang="en-US" sz="2800" dirty="0" smtClean="0"/>
               <a:t>Example 2 – Hyperlink interrupt</a:t>
             </a:r>
-            <a:endParaRPr lang="en-US" sz="2800" dirty="0" smtClean="0"/>
           </a:p>
           <a:p>
             <a:r>
               <a:rPr lang="en-US" sz="2800" dirty="0" smtClean="0"/>
               <a:t>ARM interrupt scheme</a:t>
             </a:r>
-            <a:endParaRPr lang="en-US" sz="2800" dirty="0" smtClean="0"/>
           </a:p>
         </p:txBody>
       </p:sp>
@@ -10845,20 +10834,12 @@
               <a:rPr lang="en-US" sz="3600" dirty="0" smtClean="0"/>
               <a:t>Example 1 – </a:t>
             </a:r>
-            <a:r>
-              <a:rPr lang="en-US" sz="3600" dirty="0" smtClean="0"/>
-              <a:t/>
-            </a:r>
             <a:br>
               <a:rPr lang="en-US" sz="3600" dirty="0" smtClean="0"/>
             </a:br>
             <a:r>
               <a:rPr lang="en-US" sz="3600" dirty="0" smtClean="0"/>
-              <a:t>connected ISR to </a:t>
-            </a:r>
-            <a:r>
-              <a:rPr lang="en-US" sz="3600" dirty="0" smtClean="0"/>
-              <a:t>SPIXEVT</a:t>
+              <a:t>connected ISR to SPIXEVT</a:t>
             </a:r>
             <a:endParaRPr lang="en-US" sz="3600" dirty="0"/>
           </a:p>
@@ -11025,14 +11006,12 @@
               <a:rPr lang="en-US" sz="2800" dirty="0" smtClean="0"/>
               <a:t>Example 2 – Hyperlink interrupt</a:t>
             </a:r>
-            <a:endParaRPr lang="en-US" sz="2800" dirty="0" smtClean="0"/>
           </a:p>
           <a:p>
             <a:r>
               <a:rPr lang="en-US" sz="2800" dirty="0" smtClean="0"/>
               <a:t>ARM interrupt scheme</a:t>
             </a:r>
-            <a:endParaRPr lang="en-US" sz="2800" dirty="0" smtClean="0"/>
           </a:p>
         </p:txBody>
       </p:sp>
@@ -11734,7 +11713,7 @@
           <a:graphicData uri="http://schemas.openxmlformats.org/presentationml/2006/ole">
             <mc:AlternateContent xmlns:mc="http://schemas.openxmlformats.org/markup-compatibility/2006">
               <mc:Choice xmlns:v="urn:schemas-microsoft-com:vml" Requires="v">
-                <p:oleObj spid="_x0000_s3094" name="Visio" r:id="rId3" imgW="8397082" imgH="6796932" progId="Visio.Drawing.11">
+                <p:oleObj spid="_x0000_s3096" name="Visio" r:id="rId3" imgW="8397082" imgH="6796932" progId="Visio.Drawing.11">
                   <p:embed/>
                 </p:oleObj>
               </mc:Choice>
@@ -12155,14 +12134,12 @@
               <a:rPr lang="en-US" sz="2800" b="1" dirty="0" smtClean="0"/>
               <a:t>Example 2 – Hyperlink interrupt</a:t>
             </a:r>
-            <a:endParaRPr lang="en-US" sz="2800" b="1" dirty="0" smtClean="0"/>
           </a:p>
           <a:p>
             <a:r>
               <a:rPr lang="en-US" sz="2800" dirty="0" smtClean="0"/>
               <a:t>ARM interrupt scheme</a:t>
             </a:r>
-            <a:endParaRPr lang="en-US" sz="2800" dirty="0" smtClean="0"/>
           </a:p>
         </p:txBody>
       </p:sp>
@@ -12245,10 +12222,6 @@
             <a:r>
               <a:rPr lang="en-US" sz="3600" dirty="0" smtClean="0"/>
               <a:t> Examples 2 </a:t>
-            </a:r>
-            <a:r>
-              <a:rPr lang="en-US" sz="3600" dirty="0" smtClean="0"/>
-              <a:t/>
             </a:r>
             <a:br>
               <a:rPr lang="en-US" sz="3600" dirty="0" smtClean="0"/>
@@ -12826,7 +12799,7 @@
           <a:graphicData uri="http://schemas.openxmlformats.org/presentationml/2006/ole">
             <mc:AlternateContent xmlns:mc="http://schemas.openxmlformats.org/markup-compatibility/2006">
               <mc:Choice xmlns:v="urn:schemas-microsoft-com:vml" Requires="v">
-                <p:oleObj spid="_x0000_s1048" name="Visio" r:id="rId3" imgW="8181318" imgH="5750031" progId="Visio.Drawing.11">
+                <p:oleObj spid="_x0000_s1050" name="Visio" r:id="rId3" imgW="8181318" imgH="5750031" progId="Visio.Drawing.11">
                   <p:embed/>
                 </p:oleObj>
               </mc:Choice>
@@ -13143,13 +13116,44 @@
             <a:pPr lvl="1"/>
             <a:r>
               <a:rPr lang="en-US" sz="2400" dirty="0" smtClean="0"/>
-              <a:t>You got the point</a:t>
-            </a:r>
-          </a:p>
-          <a:p>
-            <a:r>
-              <a:rPr lang="en-US" sz="2800" dirty="0" smtClean="0"/>
-              <a:t>CIC0 should map input event 111 to output event 64 (or 74, or 84 or … depends on what core is used)</a:t>
+              <a:t>You got the </a:t>
+            </a:r>
+            <a:r>
+              <a:rPr lang="en-US" sz="2400" dirty="0" smtClean="0"/>
+              <a:t>point</a:t>
+            </a:r>
+          </a:p>
+          <a:p>
+            <a:pPr marL="227013" lvl="1" indent="-227013">
+              <a:spcBef>
+                <a:spcPts val="800"/>
+              </a:spcBef>
+              <a:buFontTx/>
+              <a:buChar char="•"/>
+            </a:pPr>
+            <a:r>
+              <a:rPr lang="en-US" sz="3000" dirty="0"/>
+              <a:t>T</a:t>
+            </a:r>
+            <a:r>
+              <a:rPr lang="en-US" sz="3000" dirty="0" smtClean="0"/>
+              <a:t>he </a:t>
+            </a:r>
+            <a:r>
+              <a:rPr lang="en-US" sz="3000" dirty="0"/>
+              <a:t>code from the previous slide </a:t>
+            </a:r>
+            <a:r>
+              <a:rPr lang="en-US" sz="3000" dirty="0" smtClean="0"/>
+              <a:t>will map </a:t>
+            </a:r>
+            <a:r>
+              <a:rPr lang="en-US" sz="3000" dirty="0" smtClean="0"/>
+              <a:t>CIC0 input </a:t>
+            </a:r>
+            <a:r>
+              <a:rPr lang="en-US" sz="3000" dirty="0" smtClean="0"/>
+              <a:t>event 111 to output event 64 (or 74, or 84 or … depends on what core is used)</a:t>
             </a:r>
           </a:p>
         </p:txBody>
@@ -13274,14 +13278,12 @@
               <a:rPr lang="en-US" sz="2800" dirty="0" smtClean="0"/>
               <a:t>Example 2 – Hyperlink interrupt</a:t>
             </a:r>
-            <a:endParaRPr lang="en-US" sz="2800" dirty="0" smtClean="0"/>
           </a:p>
           <a:p>
             <a:r>
               <a:rPr lang="en-US" sz="2800" b="1" dirty="0" smtClean="0"/>
               <a:t>ARM interrupt scheme</a:t>
             </a:r>
-            <a:endParaRPr lang="en-US" sz="2800" b="1" dirty="0" smtClean="0"/>
           </a:p>
         </p:txBody>
       </p:sp>
@@ -14345,7 +14347,7 @@
           <a:graphicData uri="http://schemas.openxmlformats.org/presentationml/2006/ole">
             <mc:AlternateContent xmlns:mc="http://schemas.openxmlformats.org/markup-compatibility/2006">
               <mc:Choice xmlns:v="urn:schemas-microsoft-com:vml" Requires="v">
-                <p:oleObj spid="_x0000_s4114" name="Visio" r:id="rId3" imgW="6401070" imgH="4573925" progId="Visio.Drawing.11">
+                <p:oleObj spid="_x0000_s4116" name="Visio" r:id="rId3" imgW="6401070" imgH="4573925" progId="Visio.Drawing.11">
                   <p:embed/>
                 </p:oleObj>
               </mc:Choice>
@@ -14469,7 +14471,7 @@
           <a:graphicData uri="http://schemas.openxmlformats.org/presentationml/2006/ole">
             <mc:AlternateContent xmlns:mc="http://schemas.openxmlformats.org/markup-compatibility/2006">
               <mc:Choice xmlns:v="urn:schemas-microsoft-com:vml" Requires="v">
-                <p:oleObj spid="_x0000_s5138" name="Visio" r:id="rId3" imgW="6401070" imgH="4764674" progId="Visio.Drawing.11">
+                <p:oleObj spid="_x0000_s5140" name="Visio" r:id="rId3" imgW="6401070" imgH="4764674" progId="Visio.Drawing.11">
                   <p:embed/>
                 </p:oleObj>
               </mc:Choice>
@@ -14567,36 +14569,6 @@
               <a:buAutoNum type="arabicPeriod"/>
             </a:pPr>
             <a:endParaRPr lang="en-US" sz="1400" dirty="0"/>
-          </a:p>
-        </p:txBody>
-      </p:sp>
-      <p:sp>
-        <p:nvSpPr>
-          <p:cNvPr id="6" name="TextBox 5"/>
-          <p:cNvSpPr txBox="1"/>
-          <p:nvPr/>
-        </p:nvSpPr>
-        <p:spPr>
-          <a:xfrm>
-            <a:off x="1171575" y="6019800"/>
-            <a:ext cx="6853158" cy="369332"/>
-          </a:xfrm>
-          <a:prstGeom prst="rect">
-            <a:avLst/>
-          </a:prstGeom>
-          <a:noFill/>
-        </p:spPr>
-        <p:txBody>
-          <a:bodyPr wrap="none" rtlCol="0">
-            <a:spAutoFit/>
-          </a:bodyPr>
-          <a:lstStyle/>
-          <a:p>
-            <a:r>
-              <a:rPr lang="en-US" dirty="0" smtClean="0"/>
-              <a:t>List of Primary event – table 6-22 in 66AK2H14/12/06 Data Sheet</a:t>
-            </a:r>
-            <a:endParaRPr lang="en-US" dirty="0"/>
           </a:p>
         </p:txBody>
       </p:sp>
@@ -14645,55 +14617,6 @@
                                         </p:cTn>
                                         <p:tgtEl>
                                           <p:spTgt spid="5"/>
-                                        </p:tgtEl>
-                                        <p:attrNameLst>
-                                          <p:attrName>style.visibility</p:attrName>
-                                        </p:attrNameLst>
-                                      </p:cBhvr>
-                                      <p:to>
-                                        <p:strVal val="visible"/>
-                                      </p:to>
-                                    </p:set>
-                                  </p:childTnLst>
-                                </p:cTn>
-                              </p:par>
-                            </p:childTnLst>
-                          </p:cTn>
-                        </p:par>
-                      </p:childTnLst>
-                    </p:cTn>
-                  </p:par>
-                  <p:par>
-                    <p:cTn id="7" fill="hold">
-                      <p:stCondLst>
-                        <p:cond delay="indefinite"/>
-                      </p:stCondLst>
-                      <p:childTnLst>
-                        <p:par>
-                          <p:cTn id="8" fill="hold">
-                            <p:stCondLst>
-                              <p:cond delay="0"/>
-                            </p:stCondLst>
-                            <p:childTnLst>
-                              <p:par>
-                                <p:cTn id="9" presetID="1" presetClass="entr" presetSubtype="0" fill="hold" nodeType="clickEffect">
-                                  <p:stCondLst>
-                                    <p:cond delay="0"/>
-                                  </p:stCondLst>
-                                  <p:childTnLst>
-                                    <p:set>
-                                      <p:cBhvr>
-                                        <p:cTn id="10" dur="1" fill="hold">
-                                          <p:stCondLst>
-                                            <p:cond delay="0"/>
-                                          </p:stCondLst>
-                                        </p:cTn>
-                                        <p:tgtEl>
-                                          <p:spTgt spid="6">
-                                            <p:txEl>
-                                              <p:pRg st="0" end="0"/>
-                                            </p:txEl>
-                                          </p:spTgt>
                                         </p:tgtEl>
                                         <p:attrNameLst>
                                           <p:attrName>style.visibility</p:attrName>

</xml_diff>